<commit_message>
Xong bài đặc tả - bài báo cáo - bài present
</commit_message>
<xml_diff>
--- a/Presentation-LuanVan.pptx
+++ b/Presentation-LuanVan.pptx
@@ -24,11 +24,12 @@
     <p:sldId id="269" r:id="rId18"/>
     <p:sldId id="268" r:id="rId19"/>
     <p:sldId id="277" r:id="rId20"/>
-    <p:sldId id="275" r:id="rId21"/>
-    <p:sldId id="279" r:id="rId22"/>
-    <p:sldId id="280" r:id="rId23"/>
-    <p:sldId id="281" r:id="rId24"/>
-    <p:sldId id="278" r:id="rId25"/>
+    <p:sldId id="282" r:id="rId21"/>
+    <p:sldId id="275" r:id="rId22"/>
+    <p:sldId id="279" r:id="rId23"/>
+    <p:sldId id="280" r:id="rId24"/>
+    <p:sldId id="281" r:id="rId25"/>
+    <p:sldId id="278" r:id="rId26"/>
   </p:sldIdLst>
   <p:sldSz cx="12192000" cy="6858000"/>
   <p:notesSz cx="6858000" cy="9144000"/>
@@ -144,6 +145,10 @@
     </p:ext>
   </p:extLst>
 </p:presentation>
+</file>
+
+<file path=ppt/revisionInfo.xml><?xml version="1.0" encoding="utf-8"?>
+<p1510:revInfo xmlns:a="http://schemas.openxmlformats.org/drawingml/2006/main" xmlns:r="http://schemas.openxmlformats.org/officeDocument/2006/relationships" xmlns:p1510="http://schemas.microsoft.com/office/powerpoint/2015/10/main"/>
 </file>
 
 <file path=ppt/slideLayouts/slideLayout1.xml><?xml version="1.0" encoding="utf-8"?>
@@ -868,7 +873,7 @@
           <a:p>
             <a:fld id="{076F629C-99DC-4EB9-9C91-324E212D9F24}" type="datetimeFigureOut">
               <a:rPr lang="en-US" smtClean="0"/>
-              <a:t>17-Nov-17</a:t>
+              <a:t>18-Nov-17</a:t>
             </a:fld>
             <a:endParaRPr lang="en-US"/>
           </a:p>
@@ -1119,7 +1124,7 @@
           <a:p>
             <a:fld id="{076F629C-99DC-4EB9-9C91-324E212D9F24}" type="datetimeFigureOut">
               <a:rPr lang="en-US" smtClean="0"/>
-              <a:t>17-Nov-17</a:t>
+              <a:t>18-Nov-17</a:t>
             </a:fld>
             <a:endParaRPr lang="en-US"/>
           </a:p>
@@ -1433,7 +1438,7 @@
           <a:p>
             <a:fld id="{076F629C-99DC-4EB9-9C91-324E212D9F24}" type="datetimeFigureOut">
               <a:rPr lang="en-US" smtClean="0"/>
-              <a:t>17-Nov-17</a:t>
+              <a:t>18-Nov-17</a:t>
             </a:fld>
             <a:endParaRPr lang="en-US"/>
           </a:p>
@@ -1774,7 +1779,7 @@
           <a:p>
             <a:fld id="{076F629C-99DC-4EB9-9C91-324E212D9F24}" type="datetimeFigureOut">
               <a:rPr lang="en-US" smtClean="0"/>
-              <a:t>17-Nov-17</a:t>
+              <a:t>18-Nov-17</a:t>
             </a:fld>
             <a:endParaRPr lang="en-US"/>
           </a:p>
@@ -2088,7 +2093,7 @@
           <a:p>
             <a:fld id="{076F629C-99DC-4EB9-9C91-324E212D9F24}" type="datetimeFigureOut">
               <a:rPr lang="en-US" smtClean="0"/>
-              <a:t>17-Nov-17</a:t>
+              <a:t>18-Nov-17</a:t>
             </a:fld>
             <a:endParaRPr lang="en-US"/>
           </a:p>
@@ -2481,7 +2486,7 @@
           <a:p>
             <a:fld id="{076F629C-99DC-4EB9-9C91-324E212D9F24}" type="datetimeFigureOut">
               <a:rPr lang="en-US" smtClean="0"/>
-              <a:t>17-Nov-17</a:t>
+              <a:t>18-Nov-17</a:t>
             </a:fld>
             <a:endParaRPr lang="en-US"/>
           </a:p>
@@ -2651,7 +2656,7 @@
           <a:p>
             <a:fld id="{076F629C-99DC-4EB9-9C91-324E212D9F24}" type="datetimeFigureOut">
               <a:rPr lang="en-US" smtClean="0"/>
-              <a:t>17-Nov-17</a:t>
+              <a:t>18-Nov-17</a:t>
             </a:fld>
             <a:endParaRPr lang="en-US"/>
           </a:p>
@@ -2831,7 +2836,7 @@
           <a:p>
             <a:fld id="{076F629C-99DC-4EB9-9C91-324E212D9F24}" type="datetimeFigureOut">
               <a:rPr lang="en-US" smtClean="0"/>
-              <a:t>17-Nov-17</a:t>
+              <a:t>18-Nov-17</a:t>
             </a:fld>
             <a:endParaRPr lang="en-US"/>
           </a:p>
@@ -3007,7 +3012,7 @@
           <a:p>
             <a:fld id="{076F629C-99DC-4EB9-9C91-324E212D9F24}" type="datetimeFigureOut">
               <a:rPr lang="en-US" smtClean="0"/>
-              <a:t>17-Nov-17</a:t>
+              <a:t>18-Nov-17</a:t>
             </a:fld>
             <a:endParaRPr lang="en-US"/>
           </a:p>
@@ -3254,7 +3259,7 @@
           <a:p>
             <a:fld id="{076F629C-99DC-4EB9-9C91-324E212D9F24}" type="datetimeFigureOut">
               <a:rPr lang="en-US" smtClean="0"/>
-              <a:t>17-Nov-17</a:t>
+              <a:t>18-Nov-17</a:t>
             </a:fld>
             <a:endParaRPr lang="en-US"/>
           </a:p>
@@ -3486,7 +3491,7 @@
           <a:p>
             <a:fld id="{076F629C-99DC-4EB9-9C91-324E212D9F24}" type="datetimeFigureOut">
               <a:rPr lang="en-US" smtClean="0"/>
-              <a:t>17-Nov-17</a:t>
+              <a:t>18-Nov-17</a:t>
             </a:fld>
             <a:endParaRPr lang="en-US"/>
           </a:p>
@@ -3860,7 +3865,7 @@
           <a:p>
             <a:fld id="{076F629C-99DC-4EB9-9C91-324E212D9F24}" type="datetimeFigureOut">
               <a:rPr lang="en-US" smtClean="0"/>
-              <a:t>17-Nov-17</a:t>
+              <a:t>18-Nov-17</a:t>
             </a:fld>
             <a:endParaRPr lang="en-US"/>
           </a:p>
@@ -3983,7 +3988,7 @@
           <a:p>
             <a:fld id="{076F629C-99DC-4EB9-9C91-324E212D9F24}" type="datetimeFigureOut">
               <a:rPr lang="en-US" smtClean="0"/>
-              <a:t>17-Nov-17</a:t>
+              <a:t>18-Nov-17</a:t>
             </a:fld>
             <a:endParaRPr lang="en-US"/>
           </a:p>
@@ -4078,7 +4083,7 @@
           <a:p>
             <a:fld id="{076F629C-99DC-4EB9-9C91-324E212D9F24}" type="datetimeFigureOut">
               <a:rPr lang="en-US" smtClean="0"/>
-              <a:t>17-Nov-17</a:t>
+              <a:t>18-Nov-17</a:t>
             </a:fld>
             <a:endParaRPr lang="en-US"/>
           </a:p>
@@ -4333,7 +4338,7 @@
           <a:p>
             <a:fld id="{076F629C-99DC-4EB9-9C91-324E212D9F24}" type="datetimeFigureOut">
               <a:rPr lang="en-US" smtClean="0"/>
-              <a:t>17-Nov-17</a:t>
+              <a:t>18-Nov-17</a:t>
             </a:fld>
             <a:endParaRPr lang="en-US"/>
           </a:p>
@@ -4596,7 +4601,7 @@
           <a:p>
             <a:fld id="{076F629C-99DC-4EB9-9C91-324E212D9F24}" type="datetimeFigureOut">
               <a:rPr lang="en-US" smtClean="0"/>
-              <a:t>17-Nov-17</a:t>
+              <a:t>18-Nov-17</a:t>
             </a:fld>
             <a:endParaRPr lang="en-US"/>
           </a:p>
@@ -5339,7 +5344,7 @@
           <a:p>
             <a:fld id="{076F629C-99DC-4EB9-9C91-324E212D9F24}" type="datetimeFigureOut">
               <a:rPr lang="en-US" smtClean="0"/>
-              <a:t>17-Nov-17</a:t>
+              <a:t>18-Nov-17</a:t>
             </a:fld>
             <a:endParaRPr lang="en-US"/>
           </a:p>
@@ -6287,8 +6292,8 @@
         </p:nvSpPr>
         <p:spPr>
           <a:xfrm>
-            <a:off x="4393251" y="4980137"/>
-            <a:ext cx="4924746" cy="1384995"/>
+            <a:off x="4462181" y="4980137"/>
+            <a:ext cx="4786888" cy="1384995"/>
           </a:xfrm>
           <a:prstGeom prst="rect">
             <a:avLst/>
@@ -6318,7 +6323,7 @@
                   <a:srgbClr val="00B050"/>
                 </a:solidFill>
               </a:rPr>
-              <a:t>Th.S</a:t>
+              <a:t>Ths</a:t>
             </a:r>
             <a:r>
               <a:rPr lang="en-US" sz="2800" b="1" dirty="0">
@@ -10640,6 +10645,136 @@
           <p:cNvPr id="2" name="Title 1">
             <a:extLst>
               <a:ext uri="{FF2B5EF4-FFF2-40B4-BE49-F238E27FC236}">
+                <a16:creationId xmlns:a16="http://schemas.microsoft.com/office/drawing/2014/main" id="{3C098FC3-5BFB-4872-BE90-715E33B42129}"/>
+              </a:ext>
+            </a:extLst>
+          </p:cNvPr>
+          <p:cNvSpPr>
+            <a:spLocks noGrp="1"/>
+          </p:cNvSpPr>
+          <p:nvPr>
+            <p:ph type="title"/>
+          </p:nvPr>
+        </p:nvSpPr>
+        <p:spPr/>
+        <p:txBody>
+          <a:bodyPr/>
+          <a:lstStyle/>
+          <a:p>
+            <a:r>
+              <a:rPr lang="en-US" dirty="0"/>
+              <a:t>IV. DEMO</a:t>
+            </a:r>
+          </a:p>
+        </p:txBody>
+      </p:sp>
+      <p:pic>
+        <p:nvPicPr>
+          <p:cNvPr id="5" name="Picture 4">
+            <a:extLst>
+              <a:ext uri="{FF2B5EF4-FFF2-40B4-BE49-F238E27FC236}">
+                <a16:creationId xmlns:a16="http://schemas.microsoft.com/office/drawing/2014/main" id="{D2A48AA5-2A02-495B-AEFA-2CE6191AC712}"/>
+              </a:ext>
+            </a:extLst>
+          </p:cNvPr>
+          <p:cNvPicPr>
+            <a:picLocks noChangeAspect="1"/>
+          </p:cNvPicPr>
+          <p:nvPr/>
+        </p:nvPicPr>
+        <p:blipFill>
+          <a:blip r:embed="rId2">
+            <a:extLst>
+              <a:ext uri="{28A0092B-C50C-407E-A947-70E740481C1C}">
+                <a14:useLocalDpi xmlns:a14="http://schemas.microsoft.com/office/drawing/2010/main" val="0"/>
+              </a:ext>
+            </a:extLst>
+          </a:blip>
+          <a:stretch>
+            <a:fillRect/>
+          </a:stretch>
+        </p:blipFill>
+        <p:spPr>
+          <a:xfrm>
+            <a:off x="1305515" y="1270000"/>
+            <a:ext cx="3224965" cy="5588000"/>
+          </a:xfrm>
+          <a:prstGeom prst="rect">
+            <a:avLst/>
+          </a:prstGeom>
+        </p:spPr>
+      </p:pic>
+      <p:pic>
+        <p:nvPicPr>
+          <p:cNvPr id="7" name="Picture 6">
+            <a:extLst>
+              <a:ext uri="{FF2B5EF4-FFF2-40B4-BE49-F238E27FC236}">
+                <a16:creationId xmlns:a16="http://schemas.microsoft.com/office/drawing/2014/main" id="{1A057C2D-7F53-4E15-B7C9-23BF397D7352}"/>
+              </a:ext>
+            </a:extLst>
+          </p:cNvPr>
+          <p:cNvPicPr>
+            <a:picLocks noChangeAspect="1"/>
+          </p:cNvPicPr>
+          <p:nvPr/>
+        </p:nvPicPr>
+        <p:blipFill>
+          <a:blip r:embed="rId3">
+            <a:extLst>
+              <a:ext uri="{28A0092B-C50C-407E-A947-70E740481C1C}">
+                <a14:useLocalDpi xmlns:a14="http://schemas.microsoft.com/office/drawing/2010/main" val="0"/>
+              </a:ext>
+            </a:extLst>
+          </a:blip>
+          <a:stretch>
+            <a:fillRect/>
+          </a:stretch>
+        </p:blipFill>
+        <p:spPr>
+          <a:xfrm>
+            <a:off x="5064738" y="1270000"/>
+            <a:ext cx="3224965" cy="5505719"/>
+          </a:xfrm>
+          <a:prstGeom prst="rect">
+            <a:avLst/>
+          </a:prstGeom>
+        </p:spPr>
+      </p:pic>
+    </p:spTree>
+    <p:extLst>
+      <p:ext uri="{BB962C8B-B14F-4D97-AF65-F5344CB8AC3E}">
+        <p14:creationId xmlns:p14="http://schemas.microsoft.com/office/powerpoint/2010/main" val="1730101928"/>
+      </p:ext>
+    </p:extLst>
+  </p:cSld>
+  <p:clrMapOvr>
+    <a:masterClrMapping/>
+  </p:clrMapOvr>
+</p:sld>
+</file>
+
+<file path=ppt/slides/slide21.xml><?xml version="1.0" encoding="utf-8"?>
+<p:sld xmlns:a="http://schemas.openxmlformats.org/drawingml/2006/main" xmlns:r="http://schemas.openxmlformats.org/officeDocument/2006/relationships" xmlns:p="http://schemas.openxmlformats.org/presentationml/2006/main">
+  <p:cSld>
+    <p:spTree>
+      <p:nvGrpSpPr>
+        <p:cNvPr id="1" name=""/>
+        <p:cNvGrpSpPr/>
+        <p:nvPr/>
+      </p:nvGrpSpPr>
+      <p:grpSpPr>
+        <a:xfrm>
+          <a:off x="0" y="0"/>
+          <a:ext cx="0" cy="0"/>
+          <a:chOff x="0" y="0"/>
+          <a:chExt cx="0" cy="0"/>
+        </a:xfrm>
+      </p:grpSpPr>
+      <p:sp>
+        <p:nvSpPr>
+          <p:cNvPr id="2" name="Title 1">
+            <a:extLst>
+              <a:ext uri="{FF2B5EF4-FFF2-40B4-BE49-F238E27FC236}">
                 <a16:creationId xmlns:a16="http://schemas.microsoft.com/office/drawing/2014/main" id="{D980F470-DAD4-4BCA-8A3D-4B98F7EADCA8}"/>
               </a:ext>
             </a:extLst>
@@ -10789,7 +10924,7 @@
 </p:sld>
 </file>
 
-<file path=ppt/slides/slide21.xml><?xml version="1.0" encoding="utf-8"?>
+<file path=ppt/slides/slide22.xml><?xml version="1.0" encoding="utf-8"?>
 <p:sld xmlns:a="http://schemas.openxmlformats.org/drawingml/2006/main" xmlns:r="http://schemas.openxmlformats.org/officeDocument/2006/relationships" xmlns:p="http://schemas.openxmlformats.org/presentationml/2006/main">
   <p:cSld>
     <p:spTree>
@@ -10921,7 +11056,7 @@
 </p:sld>
 </file>
 
-<file path=ppt/slides/slide22.xml><?xml version="1.0" encoding="utf-8"?>
+<file path=ppt/slides/slide23.xml><?xml version="1.0" encoding="utf-8"?>
 <p:sld xmlns:a="http://schemas.openxmlformats.org/drawingml/2006/main" xmlns:r="http://schemas.openxmlformats.org/officeDocument/2006/relationships" xmlns:p="http://schemas.openxmlformats.org/presentationml/2006/main">
   <p:cSld>
     <p:spTree>
@@ -11089,7 +11224,7 @@
 </p:sld>
 </file>
 
-<file path=ppt/slides/slide23.xml><?xml version="1.0" encoding="utf-8"?>
+<file path=ppt/slides/slide24.xml><?xml version="1.0" encoding="utf-8"?>
 <p:sld xmlns:a="http://schemas.openxmlformats.org/drawingml/2006/main" xmlns:r="http://schemas.openxmlformats.org/officeDocument/2006/relationships" xmlns:p="http://schemas.openxmlformats.org/presentationml/2006/main">
   <p:cSld>
     <p:spTree>
@@ -11185,7 +11320,7 @@
 </p:sld>
 </file>
 
-<file path=ppt/slides/slide24.xml><?xml version="1.0" encoding="utf-8"?>
+<file path=ppt/slides/slide25.xml><?xml version="1.0" encoding="utf-8"?>
 <p:sld xmlns:a="http://schemas.openxmlformats.org/drawingml/2006/main" xmlns:r="http://schemas.openxmlformats.org/officeDocument/2006/relationships" xmlns:p="http://schemas.openxmlformats.org/presentationml/2006/main">
   <p:cSld>
     <p:spTree>

</xml_diff>

<commit_message>
Cập nhật file word luận văn và file pptx cho present luận văn
</commit_message>
<xml_diff>
--- a/Presentation-LuanVan.pptx
+++ b/Presentation-LuanVan.pptx
@@ -4,6 +4,12 @@
   <p:sldMasterIdLst>
     <p:sldMasterId id="2147483730" r:id="rId1"/>
   </p:sldMasterIdLst>
+  <p:notesMasterIdLst>
+    <p:notesMasterId r:id="rId30"/>
+  </p:notesMasterIdLst>
+  <p:handoutMasterIdLst>
+    <p:handoutMasterId r:id="rId31"/>
+  </p:handoutMasterIdLst>
   <p:sldIdLst>
     <p:sldId id="256" r:id="rId2"/>
     <p:sldId id="259" r:id="rId3"/>
@@ -152,6 +158,546 @@
 
 <file path=ppt/revisionInfo.xml><?xml version="1.0" encoding="utf-8"?>
 <p1510:revInfo xmlns:a="http://schemas.openxmlformats.org/drawingml/2006/main" xmlns:r="http://schemas.openxmlformats.org/officeDocument/2006/relationships" xmlns:p1510="http://schemas.microsoft.com/office/powerpoint/2015/10/main"/>
+</file>
+
+<file path=ppt/handoutMasters/handoutMaster1.xml><?xml version="1.0" encoding="utf-8"?>
+<p:handoutMaster xmlns:a="http://schemas.openxmlformats.org/drawingml/2006/main" xmlns:r="http://schemas.openxmlformats.org/officeDocument/2006/relationships" xmlns:p="http://schemas.openxmlformats.org/presentationml/2006/main">
+  <p:cSld>
+    <p:bg>
+      <p:bgRef idx="1001">
+        <a:schemeClr val="bg1"/>
+      </p:bgRef>
+    </p:bg>
+    <p:spTree>
+      <p:nvGrpSpPr>
+        <p:cNvPr id="1" name=""/>
+        <p:cNvGrpSpPr/>
+        <p:nvPr/>
+      </p:nvGrpSpPr>
+      <p:grpSpPr>
+        <a:xfrm>
+          <a:off x="0" y="0"/>
+          <a:ext cx="0" cy="0"/>
+          <a:chOff x="0" y="0"/>
+          <a:chExt cx="0" cy="0"/>
+        </a:xfrm>
+      </p:grpSpPr>
+      <p:sp>
+        <p:nvSpPr>
+          <p:cNvPr id="2" name="Header Placeholder 1">
+            <a:extLst>
+              <a:ext uri="{FF2B5EF4-FFF2-40B4-BE49-F238E27FC236}">
+                <a16:creationId xmlns:a16="http://schemas.microsoft.com/office/drawing/2014/main" id="{644FA80B-5CB1-4BE3-B3D1-AF5779975B30}"/>
+              </a:ext>
+            </a:extLst>
+          </p:cNvPr>
+          <p:cNvSpPr>
+            <a:spLocks noGrp="1"/>
+          </p:cNvSpPr>
+          <p:nvPr>
+            <p:ph type="hdr" sz="quarter"/>
+          </p:nvPr>
+        </p:nvSpPr>
+        <p:spPr>
+          <a:xfrm>
+            <a:off x="0" y="0"/>
+            <a:ext cx="2971800" cy="458788"/>
+          </a:xfrm>
+          <a:prstGeom prst="rect">
+            <a:avLst/>
+          </a:prstGeom>
+        </p:spPr>
+        <p:txBody>
+          <a:bodyPr vert="horz" lIns="91440" tIns="45720" rIns="91440" bIns="45720" rtlCol="0"/>
+          <a:lstStyle>
+            <a:lvl1pPr algn="l">
+              <a:defRPr sz="1200"/>
+            </a:lvl1pPr>
+          </a:lstStyle>
+          <a:p>
+            <a:endParaRPr lang="en-US"/>
+          </a:p>
+        </p:txBody>
+      </p:sp>
+      <p:sp>
+        <p:nvSpPr>
+          <p:cNvPr id="3" name="Date Placeholder 2">
+            <a:extLst>
+              <a:ext uri="{FF2B5EF4-FFF2-40B4-BE49-F238E27FC236}">
+                <a16:creationId xmlns:a16="http://schemas.microsoft.com/office/drawing/2014/main" id="{BE00D821-5B28-4695-819B-2C96C18B0F12}"/>
+              </a:ext>
+            </a:extLst>
+          </p:cNvPr>
+          <p:cNvSpPr>
+            <a:spLocks noGrp="1"/>
+          </p:cNvSpPr>
+          <p:nvPr>
+            <p:ph type="dt" sz="quarter" idx="1"/>
+          </p:nvPr>
+        </p:nvSpPr>
+        <p:spPr>
+          <a:xfrm>
+            <a:off x="3884613" y="0"/>
+            <a:ext cx="2971800" cy="458788"/>
+          </a:xfrm>
+          <a:prstGeom prst="rect">
+            <a:avLst/>
+          </a:prstGeom>
+        </p:spPr>
+        <p:txBody>
+          <a:bodyPr vert="horz" lIns="91440" tIns="45720" rIns="91440" bIns="45720" rtlCol="0"/>
+          <a:lstStyle>
+            <a:lvl1pPr algn="r">
+              <a:defRPr sz="1200"/>
+            </a:lvl1pPr>
+          </a:lstStyle>
+          <a:p>
+            <a:fld id="{03458F59-5BFC-4C23-A30B-0CD1767A6077}" type="datetimeFigureOut">
+              <a:rPr lang="en-US" smtClean="0"/>
+              <a:t>28-Nov-17</a:t>
+            </a:fld>
+            <a:endParaRPr lang="en-US"/>
+          </a:p>
+        </p:txBody>
+      </p:sp>
+      <p:sp>
+        <p:nvSpPr>
+          <p:cNvPr id="4" name="Footer Placeholder 3">
+            <a:extLst>
+              <a:ext uri="{FF2B5EF4-FFF2-40B4-BE49-F238E27FC236}">
+                <a16:creationId xmlns:a16="http://schemas.microsoft.com/office/drawing/2014/main" id="{6497C903-4796-4023-B45F-97ABD29E6117}"/>
+              </a:ext>
+            </a:extLst>
+          </p:cNvPr>
+          <p:cNvSpPr>
+            <a:spLocks noGrp="1"/>
+          </p:cNvSpPr>
+          <p:nvPr>
+            <p:ph type="ftr" sz="quarter" idx="2"/>
+          </p:nvPr>
+        </p:nvSpPr>
+        <p:spPr>
+          <a:xfrm>
+            <a:off x="0" y="8685213"/>
+            <a:ext cx="2971800" cy="458787"/>
+          </a:xfrm>
+          <a:prstGeom prst="rect">
+            <a:avLst/>
+          </a:prstGeom>
+        </p:spPr>
+        <p:txBody>
+          <a:bodyPr vert="horz" lIns="91440" tIns="45720" rIns="91440" bIns="45720" rtlCol="0" anchor="b"/>
+          <a:lstStyle>
+            <a:lvl1pPr algn="l">
+              <a:defRPr sz="1200"/>
+            </a:lvl1pPr>
+          </a:lstStyle>
+          <a:p>
+            <a:endParaRPr lang="en-US"/>
+          </a:p>
+        </p:txBody>
+      </p:sp>
+      <p:sp>
+        <p:nvSpPr>
+          <p:cNvPr id="5" name="Slide Number Placeholder 4">
+            <a:extLst>
+              <a:ext uri="{FF2B5EF4-FFF2-40B4-BE49-F238E27FC236}">
+                <a16:creationId xmlns:a16="http://schemas.microsoft.com/office/drawing/2014/main" id="{540365F6-3741-449A-826C-B7AFAA8A59B5}"/>
+              </a:ext>
+            </a:extLst>
+          </p:cNvPr>
+          <p:cNvSpPr>
+            <a:spLocks noGrp="1"/>
+          </p:cNvSpPr>
+          <p:nvPr>
+            <p:ph type="sldNum" sz="quarter" idx="3"/>
+          </p:nvPr>
+        </p:nvSpPr>
+        <p:spPr>
+          <a:xfrm>
+            <a:off x="3884613" y="8685213"/>
+            <a:ext cx="2971800" cy="458787"/>
+          </a:xfrm>
+          <a:prstGeom prst="rect">
+            <a:avLst/>
+          </a:prstGeom>
+        </p:spPr>
+        <p:txBody>
+          <a:bodyPr vert="horz" lIns="91440" tIns="45720" rIns="91440" bIns="45720" rtlCol="0" anchor="b"/>
+          <a:lstStyle>
+            <a:lvl1pPr algn="r">
+              <a:defRPr sz="1200"/>
+            </a:lvl1pPr>
+          </a:lstStyle>
+          <a:p>
+            <a:fld id="{24E784BB-F703-481A-8955-2F0E5DDA0CD8}" type="slidenum">
+              <a:rPr lang="en-US" smtClean="0"/>
+              <a:t>‹#›</a:t>
+            </a:fld>
+            <a:endParaRPr lang="en-US"/>
+          </a:p>
+        </p:txBody>
+      </p:sp>
+    </p:spTree>
+    <p:extLst>
+      <p:ext uri="{BB962C8B-B14F-4D97-AF65-F5344CB8AC3E}">
+        <p14:creationId xmlns:p14="http://schemas.microsoft.com/office/powerpoint/2010/main" val="3129164816"/>
+      </p:ext>
+    </p:extLst>
+  </p:cSld>
+  <p:clrMap bg1="lt1" tx1="dk1" bg2="lt2" tx2="dk2" accent1="accent1" accent2="accent2" accent3="accent3" accent4="accent4" accent5="accent5" accent6="accent6" hlink="hlink" folHlink="folHlink"/>
+  <p:hf hdr="0" ftr="0" dt="0"/>
+</p:handoutMaster>
+</file>
+
+<file path=ppt/notesMasters/notesMaster1.xml><?xml version="1.0" encoding="utf-8"?>
+<p:notesMaster xmlns:a="http://schemas.openxmlformats.org/drawingml/2006/main" xmlns:r="http://schemas.openxmlformats.org/officeDocument/2006/relationships" xmlns:p="http://schemas.openxmlformats.org/presentationml/2006/main">
+  <p:cSld>
+    <p:bg>
+      <p:bgRef idx="1001">
+        <a:schemeClr val="bg1"/>
+      </p:bgRef>
+    </p:bg>
+    <p:spTree>
+      <p:nvGrpSpPr>
+        <p:cNvPr id="1" name=""/>
+        <p:cNvGrpSpPr/>
+        <p:nvPr/>
+      </p:nvGrpSpPr>
+      <p:grpSpPr>
+        <a:xfrm>
+          <a:off x="0" y="0"/>
+          <a:ext cx="0" cy="0"/>
+          <a:chOff x="0" y="0"/>
+          <a:chExt cx="0" cy="0"/>
+        </a:xfrm>
+      </p:grpSpPr>
+      <p:sp>
+        <p:nvSpPr>
+          <p:cNvPr id="2" name="Header Placeholder 1"/>
+          <p:cNvSpPr>
+            <a:spLocks noGrp="1"/>
+          </p:cNvSpPr>
+          <p:nvPr>
+            <p:ph type="hdr" sz="quarter"/>
+          </p:nvPr>
+        </p:nvSpPr>
+        <p:spPr>
+          <a:xfrm>
+            <a:off x="0" y="0"/>
+            <a:ext cx="2971800" cy="458788"/>
+          </a:xfrm>
+          <a:prstGeom prst="rect">
+            <a:avLst/>
+          </a:prstGeom>
+        </p:spPr>
+        <p:txBody>
+          <a:bodyPr vert="horz" lIns="91440" tIns="45720" rIns="91440" bIns="45720" rtlCol="0"/>
+          <a:lstStyle>
+            <a:lvl1pPr algn="l">
+              <a:defRPr sz="1200"/>
+            </a:lvl1pPr>
+          </a:lstStyle>
+          <a:p>
+            <a:endParaRPr lang="en-US"/>
+          </a:p>
+        </p:txBody>
+      </p:sp>
+      <p:sp>
+        <p:nvSpPr>
+          <p:cNvPr id="3" name="Date Placeholder 2"/>
+          <p:cNvSpPr>
+            <a:spLocks noGrp="1"/>
+          </p:cNvSpPr>
+          <p:nvPr>
+            <p:ph type="dt" idx="1"/>
+          </p:nvPr>
+        </p:nvSpPr>
+        <p:spPr>
+          <a:xfrm>
+            <a:off x="3884613" y="0"/>
+            <a:ext cx="2971800" cy="458788"/>
+          </a:xfrm>
+          <a:prstGeom prst="rect">
+            <a:avLst/>
+          </a:prstGeom>
+        </p:spPr>
+        <p:txBody>
+          <a:bodyPr vert="horz" lIns="91440" tIns="45720" rIns="91440" bIns="45720" rtlCol="0"/>
+          <a:lstStyle>
+            <a:lvl1pPr algn="r">
+              <a:defRPr sz="1200"/>
+            </a:lvl1pPr>
+          </a:lstStyle>
+          <a:p>
+            <a:fld id="{C3485123-472A-4794-AC61-7D4BD4EA3B0F}" type="datetimeFigureOut">
+              <a:rPr lang="en-US" smtClean="0"/>
+              <a:t>28-Nov-17</a:t>
+            </a:fld>
+            <a:endParaRPr lang="en-US"/>
+          </a:p>
+        </p:txBody>
+      </p:sp>
+      <p:sp>
+        <p:nvSpPr>
+          <p:cNvPr id="4" name="Slide Image Placeholder 3"/>
+          <p:cNvSpPr>
+            <a:spLocks noGrp="1" noRot="1" noChangeAspect="1"/>
+          </p:cNvSpPr>
+          <p:nvPr>
+            <p:ph type="sldImg" idx="2"/>
+          </p:nvPr>
+        </p:nvSpPr>
+        <p:spPr>
+          <a:xfrm>
+            <a:off x="685800" y="1143000"/>
+            <a:ext cx="5486400" cy="3086100"/>
+          </a:xfrm>
+          <a:prstGeom prst="rect">
+            <a:avLst/>
+          </a:prstGeom>
+          <a:noFill/>
+          <a:ln w="12700">
+            <a:solidFill>
+              <a:prstClr val="black"/>
+            </a:solidFill>
+          </a:ln>
+        </p:spPr>
+        <p:txBody>
+          <a:bodyPr vert="horz" lIns="91440" tIns="45720" rIns="91440" bIns="45720" rtlCol="0" anchor="ctr"/>
+          <a:lstStyle/>
+          <a:p>
+            <a:endParaRPr lang="en-US"/>
+          </a:p>
+        </p:txBody>
+      </p:sp>
+      <p:sp>
+        <p:nvSpPr>
+          <p:cNvPr id="5" name="Notes Placeholder 4"/>
+          <p:cNvSpPr>
+            <a:spLocks noGrp="1"/>
+          </p:cNvSpPr>
+          <p:nvPr>
+            <p:ph type="body" sz="quarter" idx="3"/>
+          </p:nvPr>
+        </p:nvSpPr>
+        <p:spPr>
+          <a:xfrm>
+            <a:off x="685800" y="4400550"/>
+            <a:ext cx="5486400" cy="3600450"/>
+          </a:xfrm>
+          <a:prstGeom prst="rect">
+            <a:avLst/>
+          </a:prstGeom>
+        </p:spPr>
+        <p:txBody>
+          <a:bodyPr vert="horz" lIns="91440" tIns="45720" rIns="91440" bIns="45720" rtlCol="0"/>
+          <a:lstStyle/>
+          <a:p>
+            <a:pPr lvl="0"/>
+            <a:r>
+              <a:rPr lang="en-US"/>
+              <a:t>Edit Master text styles</a:t>
+            </a:r>
+          </a:p>
+          <a:p>
+            <a:pPr lvl="1"/>
+            <a:r>
+              <a:rPr lang="en-US"/>
+              <a:t>Second level</a:t>
+            </a:r>
+          </a:p>
+          <a:p>
+            <a:pPr lvl="2"/>
+            <a:r>
+              <a:rPr lang="en-US"/>
+              <a:t>Third level</a:t>
+            </a:r>
+          </a:p>
+          <a:p>
+            <a:pPr lvl="3"/>
+            <a:r>
+              <a:rPr lang="en-US"/>
+              <a:t>Fourth level</a:t>
+            </a:r>
+          </a:p>
+          <a:p>
+            <a:pPr lvl="4"/>
+            <a:r>
+              <a:rPr lang="en-US"/>
+              <a:t>Fifth level</a:t>
+            </a:r>
+          </a:p>
+        </p:txBody>
+      </p:sp>
+      <p:sp>
+        <p:nvSpPr>
+          <p:cNvPr id="6" name="Footer Placeholder 5"/>
+          <p:cNvSpPr>
+            <a:spLocks noGrp="1"/>
+          </p:cNvSpPr>
+          <p:nvPr>
+            <p:ph type="ftr" sz="quarter" idx="4"/>
+          </p:nvPr>
+        </p:nvSpPr>
+        <p:spPr>
+          <a:xfrm>
+            <a:off x="0" y="8685213"/>
+            <a:ext cx="2971800" cy="458787"/>
+          </a:xfrm>
+          <a:prstGeom prst="rect">
+            <a:avLst/>
+          </a:prstGeom>
+        </p:spPr>
+        <p:txBody>
+          <a:bodyPr vert="horz" lIns="91440" tIns="45720" rIns="91440" bIns="45720" rtlCol="0" anchor="b"/>
+          <a:lstStyle>
+            <a:lvl1pPr algn="l">
+              <a:defRPr sz="1200"/>
+            </a:lvl1pPr>
+          </a:lstStyle>
+          <a:p>
+            <a:endParaRPr lang="en-US"/>
+          </a:p>
+        </p:txBody>
+      </p:sp>
+      <p:sp>
+        <p:nvSpPr>
+          <p:cNvPr id="7" name="Slide Number Placeholder 6"/>
+          <p:cNvSpPr>
+            <a:spLocks noGrp="1"/>
+          </p:cNvSpPr>
+          <p:nvPr>
+            <p:ph type="sldNum" sz="quarter" idx="5"/>
+          </p:nvPr>
+        </p:nvSpPr>
+        <p:spPr>
+          <a:xfrm>
+            <a:off x="3884613" y="8685213"/>
+            <a:ext cx="2971800" cy="458787"/>
+          </a:xfrm>
+          <a:prstGeom prst="rect">
+            <a:avLst/>
+          </a:prstGeom>
+        </p:spPr>
+        <p:txBody>
+          <a:bodyPr vert="horz" lIns="91440" tIns="45720" rIns="91440" bIns="45720" rtlCol="0" anchor="b"/>
+          <a:lstStyle>
+            <a:lvl1pPr algn="r">
+              <a:defRPr sz="1200"/>
+            </a:lvl1pPr>
+          </a:lstStyle>
+          <a:p>
+            <a:fld id="{C5B28697-986A-40D8-A866-8267F43CAE9A}" type="slidenum">
+              <a:rPr lang="en-US" smtClean="0"/>
+              <a:t>‹#›</a:t>
+            </a:fld>
+            <a:endParaRPr lang="en-US"/>
+          </a:p>
+        </p:txBody>
+      </p:sp>
+    </p:spTree>
+    <p:extLst>
+      <p:ext uri="{BB962C8B-B14F-4D97-AF65-F5344CB8AC3E}">
+        <p14:creationId xmlns:p14="http://schemas.microsoft.com/office/powerpoint/2010/main" val="4246675578"/>
+      </p:ext>
+    </p:extLst>
+  </p:cSld>
+  <p:clrMap bg1="lt1" tx1="dk1" bg2="lt2" tx2="dk2" accent1="accent1" accent2="accent2" accent3="accent3" accent4="accent4" accent5="accent5" accent6="accent6" hlink="hlink" folHlink="folHlink"/>
+  <p:hf hdr="0" ftr="0" dt="0"/>
+  <p:notesStyle>
+    <a:lvl1pPr marL="0" algn="l" defTabSz="914400" rtl="0" eaLnBrk="1" latinLnBrk="0" hangingPunct="1">
+      <a:defRPr sz="1200" kern="1200">
+        <a:solidFill>
+          <a:schemeClr val="tx1"/>
+        </a:solidFill>
+        <a:latin typeface="+mn-lt"/>
+        <a:ea typeface="+mn-ea"/>
+        <a:cs typeface="+mn-cs"/>
+      </a:defRPr>
+    </a:lvl1pPr>
+    <a:lvl2pPr marL="457200" algn="l" defTabSz="914400" rtl="0" eaLnBrk="1" latinLnBrk="0" hangingPunct="1">
+      <a:defRPr sz="1200" kern="1200">
+        <a:solidFill>
+          <a:schemeClr val="tx1"/>
+        </a:solidFill>
+        <a:latin typeface="+mn-lt"/>
+        <a:ea typeface="+mn-ea"/>
+        <a:cs typeface="+mn-cs"/>
+      </a:defRPr>
+    </a:lvl2pPr>
+    <a:lvl3pPr marL="914400" algn="l" defTabSz="914400" rtl="0" eaLnBrk="1" latinLnBrk="0" hangingPunct="1">
+      <a:defRPr sz="1200" kern="1200">
+        <a:solidFill>
+          <a:schemeClr val="tx1"/>
+        </a:solidFill>
+        <a:latin typeface="+mn-lt"/>
+        <a:ea typeface="+mn-ea"/>
+        <a:cs typeface="+mn-cs"/>
+      </a:defRPr>
+    </a:lvl3pPr>
+    <a:lvl4pPr marL="1371600" algn="l" defTabSz="914400" rtl="0" eaLnBrk="1" latinLnBrk="0" hangingPunct="1">
+      <a:defRPr sz="1200" kern="1200">
+        <a:solidFill>
+          <a:schemeClr val="tx1"/>
+        </a:solidFill>
+        <a:latin typeface="+mn-lt"/>
+        <a:ea typeface="+mn-ea"/>
+        <a:cs typeface="+mn-cs"/>
+      </a:defRPr>
+    </a:lvl4pPr>
+    <a:lvl5pPr marL="1828800" algn="l" defTabSz="914400" rtl="0" eaLnBrk="1" latinLnBrk="0" hangingPunct="1">
+      <a:defRPr sz="1200" kern="1200">
+        <a:solidFill>
+          <a:schemeClr val="tx1"/>
+        </a:solidFill>
+        <a:latin typeface="+mn-lt"/>
+        <a:ea typeface="+mn-ea"/>
+        <a:cs typeface="+mn-cs"/>
+      </a:defRPr>
+    </a:lvl5pPr>
+    <a:lvl6pPr marL="2286000" algn="l" defTabSz="914400" rtl="0" eaLnBrk="1" latinLnBrk="0" hangingPunct="1">
+      <a:defRPr sz="1200" kern="1200">
+        <a:solidFill>
+          <a:schemeClr val="tx1"/>
+        </a:solidFill>
+        <a:latin typeface="+mn-lt"/>
+        <a:ea typeface="+mn-ea"/>
+        <a:cs typeface="+mn-cs"/>
+      </a:defRPr>
+    </a:lvl6pPr>
+    <a:lvl7pPr marL="2743200" algn="l" defTabSz="914400" rtl="0" eaLnBrk="1" latinLnBrk="0" hangingPunct="1">
+      <a:defRPr sz="1200" kern="1200">
+        <a:solidFill>
+          <a:schemeClr val="tx1"/>
+        </a:solidFill>
+        <a:latin typeface="+mn-lt"/>
+        <a:ea typeface="+mn-ea"/>
+        <a:cs typeface="+mn-cs"/>
+      </a:defRPr>
+    </a:lvl7pPr>
+    <a:lvl8pPr marL="3200400" algn="l" defTabSz="914400" rtl="0" eaLnBrk="1" latinLnBrk="0" hangingPunct="1">
+      <a:defRPr sz="1200" kern="1200">
+        <a:solidFill>
+          <a:schemeClr val="tx1"/>
+        </a:solidFill>
+        <a:latin typeface="+mn-lt"/>
+        <a:ea typeface="+mn-ea"/>
+        <a:cs typeface="+mn-cs"/>
+      </a:defRPr>
+    </a:lvl8pPr>
+    <a:lvl9pPr marL="3657600" algn="l" defTabSz="914400" rtl="0" eaLnBrk="1" latinLnBrk="0" hangingPunct="1">
+      <a:defRPr sz="1200" kern="1200">
+        <a:solidFill>
+          <a:schemeClr val="tx1"/>
+        </a:solidFill>
+        <a:latin typeface="+mn-lt"/>
+        <a:ea typeface="+mn-ea"/>
+        <a:cs typeface="+mn-cs"/>
+      </a:defRPr>
+    </a:lvl9pPr>
+  </p:notesStyle>
+</p:notesMaster>
 </file>
 
 <file path=ppt/slideLayouts/slideLayout1.xml><?xml version="1.0" encoding="utf-8"?>
@@ -874,9 +1420,9 @@
           <a:bodyPr/>
           <a:lstStyle/>
           <a:p>
-            <a:fld id="{076F629C-99DC-4EB9-9C91-324E212D9F24}" type="datetimeFigureOut">
+            <a:fld id="{735D7303-448D-4987-A713-76FC59F558D7}" type="datetime1">
               <a:rPr lang="en-US" smtClean="0"/>
-              <a:t>20-Nov-17</a:t>
+              <a:t>28-Nov-17</a:t>
             </a:fld>
             <a:endParaRPr lang="en-US"/>
           </a:p>
@@ -1125,9 +1671,9 @@
           <a:bodyPr/>
           <a:lstStyle/>
           <a:p>
-            <a:fld id="{076F629C-99DC-4EB9-9C91-324E212D9F24}" type="datetimeFigureOut">
+            <a:fld id="{3A168744-867E-4C24-8B2E-AF302187F4BF}" type="datetime1">
               <a:rPr lang="en-US" smtClean="0"/>
-              <a:t>20-Nov-17</a:t>
+              <a:t>28-Nov-17</a:t>
             </a:fld>
             <a:endParaRPr lang="en-US"/>
           </a:p>
@@ -1439,9 +1985,9 @@
           <a:bodyPr/>
           <a:lstStyle/>
           <a:p>
-            <a:fld id="{076F629C-99DC-4EB9-9C91-324E212D9F24}" type="datetimeFigureOut">
+            <a:fld id="{4E37A866-E1EF-4238-B2BE-30EF4FE8AB8B}" type="datetime1">
               <a:rPr lang="en-US" smtClean="0"/>
-              <a:t>20-Nov-17</a:t>
+              <a:t>28-Nov-17</a:t>
             </a:fld>
             <a:endParaRPr lang="en-US"/>
           </a:p>
@@ -1780,9 +2326,9 @@
           <a:bodyPr/>
           <a:lstStyle/>
           <a:p>
-            <a:fld id="{076F629C-99DC-4EB9-9C91-324E212D9F24}" type="datetimeFigureOut">
+            <a:fld id="{473C88BB-6CEE-48B5-A07A-84EC3F1C940F}" type="datetime1">
               <a:rPr lang="en-US" smtClean="0"/>
-              <a:t>20-Nov-17</a:t>
+              <a:t>28-Nov-17</a:t>
             </a:fld>
             <a:endParaRPr lang="en-US"/>
           </a:p>
@@ -2094,9 +2640,9 @@
           <a:bodyPr/>
           <a:lstStyle/>
           <a:p>
-            <a:fld id="{076F629C-99DC-4EB9-9C91-324E212D9F24}" type="datetimeFigureOut">
+            <a:fld id="{0C8D88AC-8907-4979-9AC5-0446AA2547BC}" type="datetime1">
               <a:rPr lang="en-US" smtClean="0"/>
-              <a:t>20-Nov-17</a:t>
+              <a:t>28-Nov-17</a:t>
             </a:fld>
             <a:endParaRPr lang="en-US"/>
           </a:p>
@@ -2487,9 +3033,9 @@
           <a:bodyPr/>
           <a:lstStyle/>
           <a:p>
-            <a:fld id="{076F629C-99DC-4EB9-9C91-324E212D9F24}" type="datetimeFigureOut">
+            <a:fld id="{8B6ABAD7-3757-45A7-BC7A-8CE5E952CE8A}" type="datetime1">
               <a:rPr lang="en-US" smtClean="0"/>
-              <a:t>20-Nov-17</a:t>
+              <a:t>28-Nov-17</a:t>
             </a:fld>
             <a:endParaRPr lang="en-US"/>
           </a:p>
@@ -2657,9 +3203,9 @@
           <a:bodyPr/>
           <a:lstStyle/>
           <a:p>
-            <a:fld id="{076F629C-99DC-4EB9-9C91-324E212D9F24}" type="datetimeFigureOut">
+            <a:fld id="{EDE45C13-6047-4259-9E1A-846E393D5B05}" type="datetime1">
               <a:rPr lang="en-US" smtClean="0"/>
-              <a:t>20-Nov-17</a:t>
+              <a:t>28-Nov-17</a:t>
             </a:fld>
             <a:endParaRPr lang="en-US"/>
           </a:p>
@@ -2837,9 +3383,9 @@
           <a:bodyPr/>
           <a:lstStyle/>
           <a:p>
-            <a:fld id="{076F629C-99DC-4EB9-9C91-324E212D9F24}" type="datetimeFigureOut">
+            <a:fld id="{3AF0B478-AB28-407B-B8C1-FCE727390921}" type="datetime1">
               <a:rPr lang="en-US" smtClean="0"/>
-              <a:t>20-Nov-17</a:t>
+              <a:t>28-Nov-17</a:t>
             </a:fld>
             <a:endParaRPr lang="en-US"/>
           </a:p>
@@ -3013,9 +3559,9 @@
           <a:bodyPr/>
           <a:lstStyle/>
           <a:p>
-            <a:fld id="{076F629C-99DC-4EB9-9C91-324E212D9F24}" type="datetimeFigureOut">
+            <a:fld id="{82281CFB-9E30-441C-B9D8-0729BDB9F586}" type="datetime1">
               <a:rPr lang="en-US" smtClean="0"/>
-              <a:t>20-Nov-17</a:t>
+              <a:t>28-Nov-17</a:t>
             </a:fld>
             <a:endParaRPr lang="en-US"/>
           </a:p>
@@ -3260,9 +3806,9 @@
           <a:bodyPr/>
           <a:lstStyle/>
           <a:p>
-            <a:fld id="{076F629C-99DC-4EB9-9C91-324E212D9F24}" type="datetimeFigureOut">
+            <a:fld id="{C72E0282-C93F-4BA3-BA27-9E409DBD4F37}" type="datetime1">
               <a:rPr lang="en-US" smtClean="0"/>
-              <a:t>20-Nov-17</a:t>
+              <a:t>28-Nov-17</a:t>
             </a:fld>
             <a:endParaRPr lang="en-US"/>
           </a:p>
@@ -3492,9 +4038,9 @@
           <a:bodyPr/>
           <a:lstStyle/>
           <a:p>
-            <a:fld id="{076F629C-99DC-4EB9-9C91-324E212D9F24}" type="datetimeFigureOut">
+            <a:fld id="{BFABBAD4-E38D-40D2-A1FA-160C593122CE}" type="datetime1">
               <a:rPr lang="en-US" smtClean="0"/>
-              <a:t>20-Nov-17</a:t>
+              <a:t>28-Nov-17</a:t>
             </a:fld>
             <a:endParaRPr lang="en-US"/>
           </a:p>
@@ -3866,9 +4412,9 @@
           <a:bodyPr/>
           <a:lstStyle/>
           <a:p>
-            <a:fld id="{076F629C-99DC-4EB9-9C91-324E212D9F24}" type="datetimeFigureOut">
+            <a:fld id="{79981F0E-01BA-4931-9B7C-048789FA0F66}" type="datetime1">
               <a:rPr lang="en-US" smtClean="0"/>
-              <a:t>20-Nov-17</a:t>
+              <a:t>28-Nov-17</a:t>
             </a:fld>
             <a:endParaRPr lang="en-US"/>
           </a:p>
@@ -3989,9 +4535,9 @@
           <a:bodyPr/>
           <a:lstStyle/>
           <a:p>
-            <a:fld id="{076F629C-99DC-4EB9-9C91-324E212D9F24}" type="datetimeFigureOut">
+            <a:fld id="{AD5CAD07-739F-4193-B763-9A1F340D3CA3}" type="datetime1">
               <a:rPr lang="en-US" smtClean="0"/>
-              <a:t>20-Nov-17</a:t>
+              <a:t>28-Nov-17</a:t>
             </a:fld>
             <a:endParaRPr lang="en-US"/>
           </a:p>
@@ -4084,9 +4630,9 @@
           <a:bodyPr/>
           <a:lstStyle/>
           <a:p>
-            <a:fld id="{076F629C-99DC-4EB9-9C91-324E212D9F24}" type="datetimeFigureOut">
+            <a:fld id="{8A8CA216-30D1-479F-81E1-D17C3D302EE3}" type="datetime1">
               <a:rPr lang="en-US" smtClean="0"/>
-              <a:t>20-Nov-17</a:t>
+              <a:t>28-Nov-17</a:t>
             </a:fld>
             <a:endParaRPr lang="en-US"/>
           </a:p>
@@ -4339,9 +4885,9 @@
           <a:bodyPr/>
           <a:lstStyle/>
           <a:p>
-            <a:fld id="{076F629C-99DC-4EB9-9C91-324E212D9F24}" type="datetimeFigureOut">
+            <a:fld id="{0D936126-1216-4D53-AF20-0E9966B95E8B}" type="datetime1">
               <a:rPr lang="en-US" smtClean="0"/>
-              <a:t>20-Nov-17</a:t>
+              <a:t>28-Nov-17</a:t>
             </a:fld>
             <a:endParaRPr lang="en-US"/>
           </a:p>
@@ -4602,9 +5148,9 @@
           <a:bodyPr/>
           <a:lstStyle/>
           <a:p>
-            <a:fld id="{076F629C-99DC-4EB9-9C91-324E212D9F24}" type="datetimeFigureOut">
+            <a:fld id="{2D91A28C-04A7-4BA1-A90F-F26E6C3E8D83}" type="datetime1">
               <a:rPr lang="en-US" smtClean="0"/>
-              <a:t>20-Nov-17</a:t>
+              <a:t>28-Nov-17</a:t>
             </a:fld>
             <a:endParaRPr lang="en-US"/>
           </a:p>
@@ -5345,9 +5891,9 @@
             </a:lvl1pPr>
           </a:lstStyle>
           <a:p>
-            <a:fld id="{076F629C-99DC-4EB9-9C91-324E212D9F24}" type="datetimeFigureOut">
+            <a:fld id="{08532FE4-17FC-4AA3-A264-75779A4D6D0A}" type="datetime1">
               <a:rPr lang="en-US" smtClean="0"/>
-              <a:t>20-Nov-17</a:t>
+              <a:t>28-Nov-17</a:t>
             </a:fld>
             <a:endParaRPr lang="en-US"/>
           </a:p>
@@ -5455,6 +6001,7 @@
     <p:sldLayoutId id="2147483745" r:id="rId15"/>
     <p:sldLayoutId id="2147483746" r:id="rId16"/>
   </p:sldLayoutIdLst>
+  <p:hf hdr="0" ftr="0" dt="0"/>
   <p:txStyles>
     <p:titleStyle>
       <a:lvl1pPr algn="l" defTabSz="457200" rtl="0" eaLnBrk="1" latinLnBrk="0" hangingPunct="1">
@@ -6405,6 +6952,35 @@
           </a:p>
         </p:txBody>
       </p:sp>
+      <p:sp>
+        <p:nvSpPr>
+          <p:cNvPr id="2" name="Slide Number Placeholder 1">
+            <a:extLst>
+              <a:ext uri="{FF2B5EF4-FFF2-40B4-BE49-F238E27FC236}">
+                <a16:creationId xmlns:a16="http://schemas.microsoft.com/office/drawing/2014/main" id="{176CDECA-3E3C-46E2-96C7-8E40A78DC0DC}"/>
+              </a:ext>
+            </a:extLst>
+          </p:cNvPr>
+          <p:cNvSpPr>
+            <a:spLocks noGrp="1"/>
+          </p:cNvSpPr>
+          <p:nvPr>
+            <p:ph type="sldNum" sz="quarter" idx="12"/>
+          </p:nvPr>
+        </p:nvSpPr>
+        <p:spPr/>
+        <p:txBody>
+          <a:bodyPr/>
+          <a:lstStyle/>
+          <a:p>
+            <a:fld id="{3CC90D32-697D-4F0D-8E4A-0F6F398B2A4E}" type="slidenum">
+              <a:rPr lang="en-US" smtClean="0"/>
+              <a:t>1</a:t>
+            </a:fld>
+            <a:endParaRPr lang="en-US" dirty="0"/>
+          </a:p>
+        </p:txBody>
+      </p:sp>
     </p:spTree>
     <p:extLst>
       <p:ext uri="{BB962C8B-B14F-4D97-AF65-F5344CB8AC3E}">
@@ -6525,6 +7101,35 @@
           </a:prstGeom>
         </p:spPr>
       </p:pic>
+      <p:sp>
+        <p:nvSpPr>
+          <p:cNvPr id="3" name="Slide Number Placeholder 2">
+            <a:extLst>
+              <a:ext uri="{FF2B5EF4-FFF2-40B4-BE49-F238E27FC236}">
+                <a16:creationId xmlns:a16="http://schemas.microsoft.com/office/drawing/2014/main" id="{B5BB77B1-7F61-4ADF-95F2-A7DA84EDB7B9}"/>
+              </a:ext>
+            </a:extLst>
+          </p:cNvPr>
+          <p:cNvSpPr>
+            <a:spLocks noGrp="1"/>
+          </p:cNvSpPr>
+          <p:nvPr>
+            <p:ph type="sldNum" sz="quarter" idx="12"/>
+          </p:nvPr>
+        </p:nvSpPr>
+        <p:spPr/>
+        <p:txBody>
+          <a:bodyPr/>
+          <a:lstStyle/>
+          <a:p>
+            <a:fld id="{3CC90D32-697D-4F0D-8E4A-0F6F398B2A4E}" type="slidenum">
+              <a:rPr lang="en-US" smtClean="0"/>
+              <a:t>10</a:t>
+            </a:fld>
+            <a:endParaRPr lang="en-US"/>
+          </a:p>
+        </p:txBody>
+      </p:sp>
     </p:spTree>
     <p:extLst>
       <p:ext uri="{BB962C8B-B14F-4D97-AF65-F5344CB8AC3E}">
@@ -6885,6 +7490,35 @@
               <a:t>.</a:t>
             </a:r>
             <a:endParaRPr lang="en-US" sz="2400" b="1" dirty="0"/>
+          </a:p>
+        </p:txBody>
+      </p:sp>
+      <p:sp>
+        <p:nvSpPr>
+          <p:cNvPr id="4" name="Slide Number Placeholder 3">
+            <a:extLst>
+              <a:ext uri="{FF2B5EF4-FFF2-40B4-BE49-F238E27FC236}">
+                <a16:creationId xmlns:a16="http://schemas.microsoft.com/office/drawing/2014/main" id="{D14BCE4C-0713-4C94-8AC4-464155492ADA}"/>
+              </a:ext>
+            </a:extLst>
+          </p:cNvPr>
+          <p:cNvSpPr>
+            <a:spLocks noGrp="1"/>
+          </p:cNvSpPr>
+          <p:nvPr>
+            <p:ph type="sldNum" sz="quarter" idx="12"/>
+          </p:nvPr>
+        </p:nvSpPr>
+        <p:spPr/>
+        <p:txBody>
+          <a:bodyPr/>
+          <a:lstStyle/>
+          <a:p>
+            <a:fld id="{3CC90D32-697D-4F0D-8E4A-0F6F398B2A4E}" type="slidenum">
+              <a:rPr lang="en-US" smtClean="0"/>
+              <a:t>11</a:t>
+            </a:fld>
+            <a:endParaRPr lang="en-US"/>
           </a:p>
         </p:txBody>
       </p:sp>
@@ -7723,6 +8357,35 @@
           </a:p>
         </p:txBody>
       </p:sp>
+      <p:sp>
+        <p:nvSpPr>
+          <p:cNvPr id="4" name="Slide Number Placeholder 3">
+            <a:extLst>
+              <a:ext uri="{FF2B5EF4-FFF2-40B4-BE49-F238E27FC236}">
+                <a16:creationId xmlns:a16="http://schemas.microsoft.com/office/drawing/2014/main" id="{EEDB6C31-2B4C-479B-A130-15D7ECA7DB2A}"/>
+              </a:ext>
+            </a:extLst>
+          </p:cNvPr>
+          <p:cNvSpPr>
+            <a:spLocks noGrp="1"/>
+          </p:cNvSpPr>
+          <p:nvPr>
+            <p:ph type="sldNum" sz="quarter" idx="12"/>
+          </p:nvPr>
+        </p:nvSpPr>
+        <p:spPr/>
+        <p:txBody>
+          <a:bodyPr/>
+          <a:lstStyle/>
+          <a:p>
+            <a:fld id="{3CC90D32-697D-4F0D-8E4A-0F6F398B2A4E}" type="slidenum">
+              <a:rPr lang="en-US" smtClean="0"/>
+              <a:t>12</a:t>
+            </a:fld>
+            <a:endParaRPr lang="en-US"/>
+          </a:p>
+        </p:txBody>
+      </p:sp>
     </p:spTree>
     <p:extLst>
       <p:ext uri="{BB962C8B-B14F-4D97-AF65-F5344CB8AC3E}">
@@ -8122,6 +8785,35 @@
           </a:prstGeom>
         </p:spPr>
       </p:pic>
+      <p:sp>
+        <p:nvSpPr>
+          <p:cNvPr id="3" name="Slide Number Placeholder 2">
+            <a:extLst>
+              <a:ext uri="{FF2B5EF4-FFF2-40B4-BE49-F238E27FC236}">
+                <a16:creationId xmlns:a16="http://schemas.microsoft.com/office/drawing/2014/main" id="{EF75FC47-02E0-4A51-A3E9-8C1ACE114325}"/>
+              </a:ext>
+            </a:extLst>
+          </p:cNvPr>
+          <p:cNvSpPr>
+            <a:spLocks noGrp="1"/>
+          </p:cNvSpPr>
+          <p:nvPr>
+            <p:ph type="sldNum" sz="quarter" idx="12"/>
+          </p:nvPr>
+        </p:nvSpPr>
+        <p:spPr/>
+        <p:txBody>
+          <a:bodyPr/>
+          <a:lstStyle/>
+          <a:p>
+            <a:fld id="{3CC90D32-697D-4F0D-8E4A-0F6F398B2A4E}" type="slidenum">
+              <a:rPr lang="en-US" smtClean="0"/>
+              <a:t>13</a:t>
+            </a:fld>
+            <a:endParaRPr lang="en-US"/>
+          </a:p>
+        </p:txBody>
+      </p:sp>
     </p:spTree>
     <p:extLst>
       <p:ext uri="{BB962C8B-B14F-4D97-AF65-F5344CB8AC3E}">
@@ -8276,6 +8968,35 @@
           </a:p>
           <a:p>
             <a:endParaRPr lang="en-US" sz="2400" dirty="0"/>
+          </a:p>
+        </p:txBody>
+      </p:sp>
+      <p:sp>
+        <p:nvSpPr>
+          <p:cNvPr id="4" name="Slide Number Placeholder 3">
+            <a:extLst>
+              <a:ext uri="{FF2B5EF4-FFF2-40B4-BE49-F238E27FC236}">
+                <a16:creationId xmlns:a16="http://schemas.microsoft.com/office/drawing/2014/main" id="{A058CD21-296F-43FD-82C9-046E8C33E18A}"/>
+              </a:ext>
+            </a:extLst>
+          </p:cNvPr>
+          <p:cNvSpPr>
+            <a:spLocks noGrp="1"/>
+          </p:cNvSpPr>
+          <p:nvPr>
+            <p:ph type="sldNum" sz="quarter" idx="12"/>
+          </p:nvPr>
+        </p:nvSpPr>
+        <p:spPr/>
+        <p:txBody>
+          <a:bodyPr/>
+          <a:lstStyle/>
+          <a:p>
+            <a:fld id="{3CC90D32-697D-4F0D-8E4A-0F6F398B2A4E}" type="slidenum">
+              <a:rPr lang="en-US" smtClean="0"/>
+              <a:t>14</a:t>
+            </a:fld>
+            <a:endParaRPr lang="en-US"/>
           </a:p>
         </p:txBody>
       </p:sp>
@@ -9511,6 +10232,35 @@
           </a:p>
         </p:txBody>
       </p:sp>
+      <p:sp>
+        <p:nvSpPr>
+          <p:cNvPr id="3" name="Slide Number Placeholder 2">
+            <a:extLst>
+              <a:ext uri="{FF2B5EF4-FFF2-40B4-BE49-F238E27FC236}">
+                <a16:creationId xmlns:a16="http://schemas.microsoft.com/office/drawing/2014/main" id="{6A216975-2769-4176-9EC3-01E29CE46A9A}"/>
+              </a:ext>
+            </a:extLst>
+          </p:cNvPr>
+          <p:cNvSpPr>
+            <a:spLocks noGrp="1"/>
+          </p:cNvSpPr>
+          <p:nvPr>
+            <p:ph type="sldNum" sz="quarter" idx="12"/>
+          </p:nvPr>
+        </p:nvSpPr>
+        <p:spPr/>
+        <p:txBody>
+          <a:bodyPr/>
+          <a:lstStyle/>
+          <a:p>
+            <a:fld id="{3CC90D32-697D-4F0D-8E4A-0F6F398B2A4E}" type="slidenum">
+              <a:rPr lang="en-US" smtClean="0"/>
+              <a:t>15</a:t>
+            </a:fld>
+            <a:endParaRPr lang="en-US"/>
+          </a:p>
+        </p:txBody>
+      </p:sp>
     </p:spTree>
     <p:extLst>
       <p:ext uri="{BB962C8B-B14F-4D97-AF65-F5344CB8AC3E}">
@@ -9580,6 +10330,35 @@
           </a:ln>
         </p:spPr>
       </p:pic>
+      <p:sp>
+        <p:nvSpPr>
+          <p:cNvPr id="2" name="Slide Number Placeholder 1">
+            <a:extLst>
+              <a:ext uri="{FF2B5EF4-FFF2-40B4-BE49-F238E27FC236}">
+                <a16:creationId xmlns:a16="http://schemas.microsoft.com/office/drawing/2014/main" id="{14BFF6F3-7A63-423E-BDB7-877CDB1049D9}"/>
+              </a:ext>
+            </a:extLst>
+          </p:cNvPr>
+          <p:cNvSpPr>
+            <a:spLocks noGrp="1"/>
+          </p:cNvSpPr>
+          <p:nvPr>
+            <p:ph type="sldNum" sz="quarter" idx="12"/>
+          </p:nvPr>
+        </p:nvSpPr>
+        <p:spPr/>
+        <p:txBody>
+          <a:bodyPr/>
+          <a:lstStyle/>
+          <a:p>
+            <a:fld id="{3CC90D32-697D-4F0D-8E4A-0F6F398B2A4E}" type="slidenum">
+              <a:rPr lang="en-US" smtClean="0"/>
+              <a:t>16</a:t>
+            </a:fld>
+            <a:endParaRPr lang="en-US"/>
+          </a:p>
+        </p:txBody>
+      </p:sp>
     </p:spTree>
     <p:extLst>
       <p:ext uri="{BB962C8B-B14F-4D97-AF65-F5344CB8AC3E}">
@@ -10029,6 +10808,35 @@
           </a:p>
         </p:txBody>
       </p:sp>
+      <p:sp>
+        <p:nvSpPr>
+          <p:cNvPr id="3" name="Slide Number Placeholder 2">
+            <a:extLst>
+              <a:ext uri="{FF2B5EF4-FFF2-40B4-BE49-F238E27FC236}">
+                <a16:creationId xmlns:a16="http://schemas.microsoft.com/office/drawing/2014/main" id="{63130E73-D866-48F4-AD81-B31C5FB0DF1F}"/>
+              </a:ext>
+            </a:extLst>
+          </p:cNvPr>
+          <p:cNvSpPr>
+            <a:spLocks noGrp="1"/>
+          </p:cNvSpPr>
+          <p:nvPr>
+            <p:ph type="sldNum" sz="quarter" idx="12"/>
+          </p:nvPr>
+        </p:nvSpPr>
+        <p:spPr/>
+        <p:txBody>
+          <a:bodyPr/>
+          <a:lstStyle/>
+          <a:p>
+            <a:fld id="{3CC90D32-697D-4F0D-8E4A-0F6F398B2A4E}" type="slidenum">
+              <a:rPr lang="en-US" smtClean="0"/>
+              <a:t>17</a:t>
+            </a:fld>
+            <a:endParaRPr lang="en-US"/>
+          </a:p>
+        </p:txBody>
+      </p:sp>
     </p:spTree>
     <p:extLst>
       <p:ext uri="{BB962C8B-B14F-4D97-AF65-F5344CB8AC3E}">
@@ -10147,6 +10955,35 @@
           </a:prstGeom>
         </p:spPr>
       </p:pic>
+      <p:sp>
+        <p:nvSpPr>
+          <p:cNvPr id="3" name="Slide Number Placeholder 2">
+            <a:extLst>
+              <a:ext uri="{FF2B5EF4-FFF2-40B4-BE49-F238E27FC236}">
+                <a16:creationId xmlns:a16="http://schemas.microsoft.com/office/drawing/2014/main" id="{4E9C2390-C1D2-4F64-B705-EF4114582AA9}"/>
+              </a:ext>
+            </a:extLst>
+          </p:cNvPr>
+          <p:cNvSpPr>
+            <a:spLocks noGrp="1"/>
+          </p:cNvSpPr>
+          <p:nvPr>
+            <p:ph type="sldNum" sz="quarter" idx="12"/>
+          </p:nvPr>
+        </p:nvSpPr>
+        <p:spPr/>
+        <p:txBody>
+          <a:bodyPr/>
+          <a:lstStyle/>
+          <a:p>
+            <a:fld id="{3CC90D32-697D-4F0D-8E4A-0F6F398B2A4E}" type="slidenum">
+              <a:rPr lang="en-US" smtClean="0"/>
+              <a:t>18</a:t>
+            </a:fld>
+            <a:endParaRPr lang="en-US"/>
+          </a:p>
+        </p:txBody>
+      </p:sp>
     </p:spTree>
     <p:extLst>
       <p:ext uri="{BB962C8B-B14F-4D97-AF65-F5344CB8AC3E}">
@@ -10268,6 +11105,35 @@
           </a:ln>
         </p:spPr>
       </p:pic>
+      <p:sp>
+        <p:nvSpPr>
+          <p:cNvPr id="3" name="Slide Number Placeholder 2">
+            <a:extLst>
+              <a:ext uri="{FF2B5EF4-FFF2-40B4-BE49-F238E27FC236}">
+                <a16:creationId xmlns:a16="http://schemas.microsoft.com/office/drawing/2014/main" id="{10C99F6A-016C-4812-9A62-9E5C6626F1EA}"/>
+              </a:ext>
+            </a:extLst>
+          </p:cNvPr>
+          <p:cNvSpPr>
+            <a:spLocks noGrp="1"/>
+          </p:cNvSpPr>
+          <p:nvPr>
+            <p:ph type="sldNum" sz="quarter" idx="12"/>
+          </p:nvPr>
+        </p:nvSpPr>
+        <p:spPr/>
+        <p:txBody>
+          <a:bodyPr/>
+          <a:lstStyle/>
+          <a:p>
+            <a:fld id="{3CC90D32-697D-4F0D-8E4A-0F6F398B2A4E}" type="slidenum">
+              <a:rPr lang="en-US" smtClean="0"/>
+              <a:t>19</a:t>
+            </a:fld>
+            <a:endParaRPr lang="en-US"/>
+          </a:p>
+        </p:txBody>
+      </p:sp>
     </p:spTree>
     <p:extLst>
       <p:ext uri="{BB962C8B-B14F-4D97-AF65-F5344CB8AC3E}">
@@ -10612,6 +11478,35 @@
           </a:p>
         </p:txBody>
       </p:sp>
+      <p:sp>
+        <p:nvSpPr>
+          <p:cNvPr id="3" name="Slide Number Placeholder 2">
+            <a:extLst>
+              <a:ext uri="{FF2B5EF4-FFF2-40B4-BE49-F238E27FC236}">
+                <a16:creationId xmlns:a16="http://schemas.microsoft.com/office/drawing/2014/main" id="{420A956E-C9FC-4FA1-A838-416B86040956}"/>
+              </a:ext>
+            </a:extLst>
+          </p:cNvPr>
+          <p:cNvSpPr>
+            <a:spLocks noGrp="1"/>
+          </p:cNvSpPr>
+          <p:nvPr>
+            <p:ph type="sldNum" sz="quarter" idx="12"/>
+          </p:nvPr>
+        </p:nvSpPr>
+        <p:spPr/>
+        <p:txBody>
+          <a:bodyPr/>
+          <a:lstStyle/>
+          <a:p>
+            <a:fld id="{3CC90D32-697D-4F0D-8E4A-0F6F398B2A4E}" type="slidenum">
+              <a:rPr lang="en-US" smtClean="0"/>
+              <a:t>2</a:t>
+            </a:fld>
+            <a:endParaRPr lang="en-US"/>
+          </a:p>
+        </p:txBody>
+      </p:sp>
     </p:spTree>
     <p:extLst>
       <p:ext uri="{BB962C8B-B14F-4D97-AF65-F5344CB8AC3E}">
@@ -10724,6 +11619,35 @@
           </a:prstGeom>
         </p:spPr>
       </p:pic>
+      <p:sp>
+        <p:nvSpPr>
+          <p:cNvPr id="3" name="Slide Number Placeholder 2">
+            <a:extLst>
+              <a:ext uri="{FF2B5EF4-FFF2-40B4-BE49-F238E27FC236}">
+                <a16:creationId xmlns:a16="http://schemas.microsoft.com/office/drawing/2014/main" id="{B889C08F-040B-4BD2-A133-D978BE6D5848}"/>
+              </a:ext>
+            </a:extLst>
+          </p:cNvPr>
+          <p:cNvSpPr>
+            <a:spLocks noGrp="1"/>
+          </p:cNvSpPr>
+          <p:nvPr>
+            <p:ph type="sldNum" sz="quarter" idx="12"/>
+          </p:nvPr>
+        </p:nvSpPr>
+        <p:spPr/>
+        <p:txBody>
+          <a:bodyPr/>
+          <a:lstStyle/>
+          <a:p>
+            <a:fld id="{3CC90D32-697D-4F0D-8E4A-0F6F398B2A4E}" type="slidenum">
+              <a:rPr lang="en-US" smtClean="0"/>
+              <a:t>20</a:t>
+            </a:fld>
+            <a:endParaRPr lang="en-US"/>
+          </a:p>
+        </p:txBody>
+      </p:sp>
     </p:spTree>
     <p:extLst>
       <p:ext uri="{BB962C8B-B14F-4D97-AF65-F5344CB8AC3E}">
@@ -10823,6 +11747,35 @@
           </a:ln>
         </p:spPr>
       </p:pic>
+      <p:sp>
+        <p:nvSpPr>
+          <p:cNvPr id="3" name="Slide Number Placeholder 2">
+            <a:extLst>
+              <a:ext uri="{FF2B5EF4-FFF2-40B4-BE49-F238E27FC236}">
+                <a16:creationId xmlns:a16="http://schemas.microsoft.com/office/drawing/2014/main" id="{DB1E3BF0-596B-4966-A517-6C3641AD1FC7}"/>
+              </a:ext>
+            </a:extLst>
+          </p:cNvPr>
+          <p:cNvSpPr>
+            <a:spLocks noGrp="1"/>
+          </p:cNvSpPr>
+          <p:nvPr>
+            <p:ph type="sldNum" sz="quarter" idx="12"/>
+          </p:nvPr>
+        </p:nvSpPr>
+        <p:spPr/>
+        <p:txBody>
+          <a:bodyPr/>
+          <a:lstStyle/>
+          <a:p>
+            <a:fld id="{3CC90D32-697D-4F0D-8E4A-0F6F398B2A4E}" type="slidenum">
+              <a:rPr lang="en-US" smtClean="0"/>
+              <a:t>21</a:t>
+            </a:fld>
+            <a:endParaRPr lang="en-US"/>
+          </a:p>
+        </p:txBody>
+      </p:sp>
     </p:spTree>
     <p:extLst>
       <p:ext uri="{BB962C8B-B14F-4D97-AF65-F5344CB8AC3E}">
@@ -10997,6 +11950,35 @@
           </a:prstGeom>
         </p:spPr>
       </p:pic>
+      <p:sp>
+        <p:nvSpPr>
+          <p:cNvPr id="3" name="Slide Number Placeholder 2">
+            <a:extLst>
+              <a:ext uri="{FF2B5EF4-FFF2-40B4-BE49-F238E27FC236}">
+                <a16:creationId xmlns:a16="http://schemas.microsoft.com/office/drawing/2014/main" id="{74AB0D21-93A9-4358-A5C1-603EBD1E55FA}"/>
+              </a:ext>
+            </a:extLst>
+          </p:cNvPr>
+          <p:cNvSpPr>
+            <a:spLocks noGrp="1"/>
+          </p:cNvSpPr>
+          <p:nvPr>
+            <p:ph type="sldNum" sz="quarter" idx="12"/>
+          </p:nvPr>
+        </p:nvSpPr>
+        <p:spPr/>
+        <p:txBody>
+          <a:bodyPr/>
+          <a:lstStyle/>
+          <a:p>
+            <a:fld id="{3CC90D32-697D-4F0D-8E4A-0F6F398B2A4E}" type="slidenum">
+              <a:rPr lang="en-US" smtClean="0"/>
+              <a:t>22</a:t>
+            </a:fld>
+            <a:endParaRPr lang="en-US"/>
+          </a:p>
+        </p:txBody>
+      </p:sp>
     </p:spTree>
     <p:extLst>
       <p:ext uri="{BB962C8B-B14F-4D97-AF65-F5344CB8AC3E}">
@@ -11127,6 +12109,35 @@
           </a:prstGeom>
         </p:spPr>
       </p:pic>
+      <p:sp>
+        <p:nvSpPr>
+          <p:cNvPr id="3" name="Slide Number Placeholder 2">
+            <a:extLst>
+              <a:ext uri="{FF2B5EF4-FFF2-40B4-BE49-F238E27FC236}">
+                <a16:creationId xmlns:a16="http://schemas.microsoft.com/office/drawing/2014/main" id="{1983C757-0EBC-4AC7-8C71-1BB60A86C8FF}"/>
+              </a:ext>
+            </a:extLst>
+          </p:cNvPr>
+          <p:cNvSpPr>
+            <a:spLocks noGrp="1"/>
+          </p:cNvSpPr>
+          <p:nvPr>
+            <p:ph type="sldNum" sz="quarter" idx="12"/>
+          </p:nvPr>
+        </p:nvSpPr>
+        <p:spPr/>
+        <p:txBody>
+          <a:bodyPr/>
+          <a:lstStyle/>
+          <a:p>
+            <a:fld id="{3CC90D32-697D-4F0D-8E4A-0F6F398B2A4E}" type="slidenum">
+              <a:rPr lang="en-US" smtClean="0"/>
+              <a:t>23</a:t>
+            </a:fld>
+            <a:endParaRPr lang="en-US"/>
+          </a:p>
+        </p:txBody>
+      </p:sp>
     </p:spTree>
     <p:extLst>
       <p:ext uri="{BB962C8B-B14F-4D97-AF65-F5344CB8AC3E}">
@@ -11298,6 +12309,35 @@
           </a:prstGeom>
         </p:spPr>
       </p:pic>
+      <p:sp>
+        <p:nvSpPr>
+          <p:cNvPr id="3" name="Slide Number Placeholder 2">
+            <a:extLst>
+              <a:ext uri="{FF2B5EF4-FFF2-40B4-BE49-F238E27FC236}">
+                <a16:creationId xmlns:a16="http://schemas.microsoft.com/office/drawing/2014/main" id="{7F65368C-E281-47D8-871B-6DB60455A906}"/>
+              </a:ext>
+            </a:extLst>
+          </p:cNvPr>
+          <p:cNvSpPr>
+            <a:spLocks noGrp="1"/>
+          </p:cNvSpPr>
+          <p:nvPr>
+            <p:ph type="sldNum" sz="quarter" idx="12"/>
+          </p:nvPr>
+        </p:nvSpPr>
+        <p:spPr/>
+        <p:txBody>
+          <a:bodyPr/>
+          <a:lstStyle/>
+          <a:p>
+            <a:fld id="{3CC90D32-697D-4F0D-8E4A-0F6F398B2A4E}" type="slidenum">
+              <a:rPr lang="en-US" smtClean="0"/>
+              <a:t>24</a:t>
+            </a:fld>
+            <a:endParaRPr lang="en-US"/>
+          </a:p>
+        </p:txBody>
+      </p:sp>
     </p:spTree>
     <p:extLst>
       <p:ext uri="{BB962C8B-B14F-4D97-AF65-F5344CB8AC3E}">
@@ -11430,6 +12470,35 @@
           </a:prstGeom>
         </p:spPr>
       </p:pic>
+      <p:sp>
+        <p:nvSpPr>
+          <p:cNvPr id="3" name="Slide Number Placeholder 2">
+            <a:extLst>
+              <a:ext uri="{FF2B5EF4-FFF2-40B4-BE49-F238E27FC236}">
+                <a16:creationId xmlns:a16="http://schemas.microsoft.com/office/drawing/2014/main" id="{267A42D0-006D-447A-BC0C-42FFAA77A4DB}"/>
+              </a:ext>
+            </a:extLst>
+          </p:cNvPr>
+          <p:cNvSpPr>
+            <a:spLocks noGrp="1"/>
+          </p:cNvSpPr>
+          <p:nvPr>
+            <p:ph type="sldNum" sz="quarter" idx="12"/>
+          </p:nvPr>
+        </p:nvSpPr>
+        <p:spPr/>
+        <p:txBody>
+          <a:bodyPr/>
+          <a:lstStyle/>
+          <a:p>
+            <a:fld id="{3CC90D32-697D-4F0D-8E4A-0F6F398B2A4E}" type="slidenum">
+              <a:rPr lang="en-US" smtClean="0"/>
+              <a:t>25</a:t>
+            </a:fld>
+            <a:endParaRPr lang="en-US"/>
+          </a:p>
+        </p:txBody>
+      </p:sp>
     </p:spTree>
     <p:extLst>
       <p:ext uri="{BB962C8B-B14F-4D97-AF65-F5344CB8AC3E}">
@@ -11598,6 +12667,35 @@
           </a:prstGeom>
         </p:spPr>
       </p:pic>
+      <p:sp>
+        <p:nvSpPr>
+          <p:cNvPr id="3" name="Slide Number Placeholder 2">
+            <a:extLst>
+              <a:ext uri="{FF2B5EF4-FFF2-40B4-BE49-F238E27FC236}">
+                <a16:creationId xmlns:a16="http://schemas.microsoft.com/office/drawing/2014/main" id="{923EA480-5D0C-4BE2-AE3E-1422ABAFD6E2}"/>
+              </a:ext>
+            </a:extLst>
+          </p:cNvPr>
+          <p:cNvSpPr>
+            <a:spLocks noGrp="1"/>
+          </p:cNvSpPr>
+          <p:nvPr>
+            <p:ph type="sldNum" sz="quarter" idx="12"/>
+          </p:nvPr>
+        </p:nvSpPr>
+        <p:spPr/>
+        <p:txBody>
+          <a:bodyPr/>
+          <a:lstStyle/>
+          <a:p>
+            <a:fld id="{3CC90D32-697D-4F0D-8E4A-0F6F398B2A4E}" type="slidenum">
+              <a:rPr lang="en-US" smtClean="0"/>
+              <a:t>26</a:t>
+            </a:fld>
+            <a:endParaRPr lang="en-US"/>
+          </a:p>
+        </p:txBody>
+      </p:sp>
     </p:spTree>
     <p:extLst>
       <p:ext uri="{BB962C8B-B14F-4D97-AF65-F5344CB8AC3E}">
@@ -11694,6 +12792,35 @@
           </a:prstGeom>
         </p:spPr>
       </p:pic>
+      <p:sp>
+        <p:nvSpPr>
+          <p:cNvPr id="3" name="Slide Number Placeholder 2">
+            <a:extLst>
+              <a:ext uri="{FF2B5EF4-FFF2-40B4-BE49-F238E27FC236}">
+                <a16:creationId xmlns:a16="http://schemas.microsoft.com/office/drawing/2014/main" id="{035FA791-F02E-4E14-B4CB-17D5CFF99F52}"/>
+              </a:ext>
+            </a:extLst>
+          </p:cNvPr>
+          <p:cNvSpPr>
+            <a:spLocks noGrp="1"/>
+          </p:cNvSpPr>
+          <p:nvPr>
+            <p:ph type="sldNum" sz="quarter" idx="12"/>
+          </p:nvPr>
+        </p:nvSpPr>
+        <p:spPr/>
+        <p:txBody>
+          <a:bodyPr/>
+          <a:lstStyle/>
+          <a:p>
+            <a:fld id="{3CC90D32-697D-4F0D-8E4A-0F6F398B2A4E}" type="slidenum">
+              <a:rPr lang="en-US" smtClean="0"/>
+              <a:t>27</a:t>
+            </a:fld>
+            <a:endParaRPr lang="en-US"/>
+          </a:p>
+        </p:txBody>
+      </p:sp>
     </p:spTree>
     <p:extLst>
       <p:ext uri="{BB962C8B-B14F-4D97-AF65-F5344CB8AC3E}">
@@ -11837,6 +12964,35 @@
           </a:p>
         </p:txBody>
       </p:sp>
+      <p:sp>
+        <p:nvSpPr>
+          <p:cNvPr id="2" name="Slide Number Placeholder 1">
+            <a:extLst>
+              <a:ext uri="{FF2B5EF4-FFF2-40B4-BE49-F238E27FC236}">
+                <a16:creationId xmlns:a16="http://schemas.microsoft.com/office/drawing/2014/main" id="{2DB9CCA5-4641-479D-8F0B-E589779EBD4F}"/>
+              </a:ext>
+            </a:extLst>
+          </p:cNvPr>
+          <p:cNvSpPr>
+            <a:spLocks noGrp="1"/>
+          </p:cNvSpPr>
+          <p:nvPr>
+            <p:ph type="sldNum" sz="quarter" idx="12"/>
+          </p:nvPr>
+        </p:nvSpPr>
+        <p:spPr/>
+        <p:txBody>
+          <a:bodyPr/>
+          <a:lstStyle/>
+          <a:p>
+            <a:fld id="{3CC90D32-697D-4F0D-8E4A-0F6F398B2A4E}" type="slidenum">
+              <a:rPr lang="en-US" smtClean="0"/>
+              <a:t>28</a:t>
+            </a:fld>
+            <a:endParaRPr lang="en-US"/>
+          </a:p>
+        </p:txBody>
+      </p:sp>
     </p:spTree>
     <p:extLst>
       <p:ext uri="{BB962C8B-B14F-4D97-AF65-F5344CB8AC3E}">
@@ -12305,6 +13461,35 @@
               <a:rPr lang="en-US" sz="2400" dirty="0"/>
               <a:t>.</a:t>
             </a:r>
+          </a:p>
+        </p:txBody>
+      </p:sp>
+      <p:sp>
+        <p:nvSpPr>
+          <p:cNvPr id="4" name="Slide Number Placeholder 3">
+            <a:extLst>
+              <a:ext uri="{FF2B5EF4-FFF2-40B4-BE49-F238E27FC236}">
+                <a16:creationId xmlns:a16="http://schemas.microsoft.com/office/drawing/2014/main" id="{9A48B849-04E5-4D5A-91EA-2F4507C5EA61}"/>
+              </a:ext>
+            </a:extLst>
+          </p:cNvPr>
+          <p:cNvSpPr>
+            <a:spLocks noGrp="1"/>
+          </p:cNvSpPr>
+          <p:nvPr>
+            <p:ph type="sldNum" sz="quarter" idx="12"/>
+          </p:nvPr>
+        </p:nvSpPr>
+        <p:spPr/>
+        <p:txBody>
+          <a:bodyPr/>
+          <a:lstStyle/>
+          <a:p>
+            <a:fld id="{3CC90D32-697D-4F0D-8E4A-0F6F398B2A4E}" type="slidenum">
+              <a:rPr lang="en-US" smtClean="0"/>
+              <a:t>3</a:t>
+            </a:fld>
+            <a:endParaRPr lang="en-US"/>
           </a:p>
         </p:txBody>
       </p:sp>
@@ -12994,6 +14179,35 @@
           </a:p>
           <a:p>
             <a:endParaRPr lang="en-US" sz="2400" dirty="0"/>
+          </a:p>
+        </p:txBody>
+      </p:sp>
+      <p:sp>
+        <p:nvSpPr>
+          <p:cNvPr id="4" name="Slide Number Placeholder 3">
+            <a:extLst>
+              <a:ext uri="{FF2B5EF4-FFF2-40B4-BE49-F238E27FC236}">
+                <a16:creationId xmlns:a16="http://schemas.microsoft.com/office/drawing/2014/main" id="{B0BD5E56-EB97-4557-98E7-1904075E9C31}"/>
+              </a:ext>
+            </a:extLst>
+          </p:cNvPr>
+          <p:cNvSpPr>
+            <a:spLocks noGrp="1"/>
+          </p:cNvSpPr>
+          <p:nvPr>
+            <p:ph type="sldNum" sz="quarter" idx="12"/>
+          </p:nvPr>
+        </p:nvSpPr>
+        <p:spPr/>
+        <p:txBody>
+          <a:bodyPr/>
+          <a:lstStyle/>
+          <a:p>
+            <a:fld id="{3CC90D32-697D-4F0D-8E4A-0F6F398B2A4E}" type="slidenum">
+              <a:rPr lang="en-US" smtClean="0"/>
+              <a:t>4</a:t>
+            </a:fld>
+            <a:endParaRPr lang="en-US"/>
           </a:p>
         </p:txBody>
       </p:sp>
@@ -13575,6 +14789,35 @@
           </a:p>
         </p:txBody>
       </p:sp>
+      <p:sp>
+        <p:nvSpPr>
+          <p:cNvPr id="4" name="Slide Number Placeholder 3">
+            <a:extLst>
+              <a:ext uri="{FF2B5EF4-FFF2-40B4-BE49-F238E27FC236}">
+                <a16:creationId xmlns:a16="http://schemas.microsoft.com/office/drawing/2014/main" id="{624C6A21-6786-4F7B-801B-3CC67DB34D0F}"/>
+              </a:ext>
+            </a:extLst>
+          </p:cNvPr>
+          <p:cNvSpPr>
+            <a:spLocks noGrp="1"/>
+          </p:cNvSpPr>
+          <p:nvPr>
+            <p:ph type="sldNum" sz="quarter" idx="12"/>
+          </p:nvPr>
+        </p:nvSpPr>
+        <p:spPr/>
+        <p:txBody>
+          <a:bodyPr/>
+          <a:lstStyle/>
+          <a:p>
+            <a:fld id="{3CC90D32-697D-4F0D-8E4A-0F6F398B2A4E}" type="slidenum">
+              <a:rPr lang="en-US" smtClean="0"/>
+              <a:t>5</a:t>
+            </a:fld>
+            <a:endParaRPr lang="en-US"/>
+          </a:p>
+        </p:txBody>
+      </p:sp>
     </p:spTree>
     <p:extLst>
       <p:ext uri="{BB962C8B-B14F-4D97-AF65-F5344CB8AC3E}">
@@ -13796,6 +15039,35 @@
           </a:xfrm>
         </p:spPr>
       </p:pic>
+      <p:sp>
+        <p:nvSpPr>
+          <p:cNvPr id="3" name="Slide Number Placeholder 2">
+            <a:extLst>
+              <a:ext uri="{FF2B5EF4-FFF2-40B4-BE49-F238E27FC236}">
+                <a16:creationId xmlns:a16="http://schemas.microsoft.com/office/drawing/2014/main" id="{6C2845CC-6D92-4392-9895-06CDEDBD03D4}"/>
+              </a:ext>
+            </a:extLst>
+          </p:cNvPr>
+          <p:cNvSpPr>
+            <a:spLocks noGrp="1"/>
+          </p:cNvSpPr>
+          <p:nvPr>
+            <p:ph type="sldNum" sz="quarter" idx="12"/>
+          </p:nvPr>
+        </p:nvSpPr>
+        <p:spPr/>
+        <p:txBody>
+          <a:bodyPr/>
+          <a:lstStyle/>
+          <a:p>
+            <a:fld id="{3CC90D32-697D-4F0D-8E4A-0F6F398B2A4E}" type="slidenum">
+              <a:rPr lang="en-US" smtClean="0"/>
+              <a:t>6</a:t>
+            </a:fld>
+            <a:endParaRPr lang="en-US"/>
+          </a:p>
+        </p:txBody>
+      </p:sp>
     </p:spTree>
     <p:extLst>
       <p:ext uri="{BB962C8B-B14F-4D97-AF65-F5344CB8AC3E}">
@@ -14221,6 +15493,35 @@
               <a:rPr lang="en-US" sz="2400" dirty="0"/>
               <a:t>.</a:t>
             </a:r>
+          </a:p>
+        </p:txBody>
+      </p:sp>
+      <p:sp>
+        <p:nvSpPr>
+          <p:cNvPr id="4" name="Slide Number Placeholder 3">
+            <a:extLst>
+              <a:ext uri="{FF2B5EF4-FFF2-40B4-BE49-F238E27FC236}">
+                <a16:creationId xmlns:a16="http://schemas.microsoft.com/office/drawing/2014/main" id="{DEF875E5-AF53-422C-988A-18E58BE1D872}"/>
+              </a:ext>
+            </a:extLst>
+          </p:cNvPr>
+          <p:cNvSpPr>
+            <a:spLocks noGrp="1"/>
+          </p:cNvSpPr>
+          <p:nvPr>
+            <p:ph type="sldNum" sz="quarter" idx="12"/>
+          </p:nvPr>
+        </p:nvSpPr>
+        <p:spPr/>
+        <p:txBody>
+          <a:bodyPr/>
+          <a:lstStyle/>
+          <a:p>
+            <a:fld id="{3CC90D32-697D-4F0D-8E4A-0F6F398B2A4E}" type="slidenum">
+              <a:rPr lang="en-US" smtClean="0"/>
+              <a:t>7</a:t>
+            </a:fld>
+            <a:endParaRPr lang="en-US"/>
           </a:p>
         </p:txBody>
       </p:sp>
@@ -14670,6 +15971,35 @@
           </a:p>
         </p:txBody>
       </p:sp>
+      <p:sp>
+        <p:nvSpPr>
+          <p:cNvPr id="4" name="Slide Number Placeholder 3">
+            <a:extLst>
+              <a:ext uri="{FF2B5EF4-FFF2-40B4-BE49-F238E27FC236}">
+                <a16:creationId xmlns:a16="http://schemas.microsoft.com/office/drawing/2014/main" id="{BF9BC070-339B-406E-A1AD-F3109E503BD7}"/>
+              </a:ext>
+            </a:extLst>
+          </p:cNvPr>
+          <p:cNvSpPr>
+            <a:spLocks noGrp="1"/>
+          </p:cNvSpPr>
+          <p:nvPr>
+            <p:ph type="sldNum" sz="quarter" idx="12"/>
+          </p:nvPr>
+        </p:nvSpPr>
+        <p:spPr/>
+        <p:txBody>
+          <a:bodyPr/>
+          <a:lstStyle/>
+          <a:p>
+            <a:fld id="{3CC90D32-697D-4F0D-8E4A-0F6F398B2A4E}" type="slidenum">
+              <a:rPr lang="en-US" smtClean="0"/>
+              <a:t>8</a:t>
+            </a:fld>
+            <a:endParaRPr lang="en-US"/>
+          </a:p>
+        </p:txBody>
+      </p:sp>
     </p:spTree>
     <p:extLst>
       <p:ext uri="{BB962C8B-B14F-4D97-AF65-F5344CB8AC3E}">
@@ -14953,6 +16283,35 @@
           </a:prstGeom>
         </p:spPr>
       </p:pic>
+      <p:sp>
+        <p:nvSpPr>
+          <p:cNvPr id="3" name="Slide Number Placeholder 2">
+            <a:extLst>
+              <a:ext uri="{FF2B5EF4-FFF2-40B4-BE49-F238E27FC236}">
+                <a16:creationId xmlns:a16="http://schemas.microsoft.com/office/drawing/2014/main" id="{34E5CD0A-590B-415F-83B4-B20F2D1E4A45}"/>
+              </a:ext>
+            </a:extLst>
+          </p:cNvPr>
+          <p:cNvSpPr>
+            <a:spLocks noGrp="1"/>
+          </p:cNvSpPr>
+          <p:nvPr>
+            <p:ph type="sldNum" sz="quarter" idx="12"/>
+          </p:nvPr>
+        </p:nvSpPr>
+        <p:spPr/>
+        <p:txBody>
+          <a:bodyPr/>
+          <a:lstStyle/>
+          <a:p>
+            <a:fld id="{3CC90D32-697D-4F0D-8E4A-0F6F398B2A4E}" type="slidenum">
+              <a:rPr lang="en-US" smtClean="0"/>
+              <a:t>9</a:t>
+            </a:fld>
+            <a:endParaRPr lang="en-US"/>
+          </a:p>
+        </p:txBody>
+      </p:sp>
     </p:spTree>
     <p:extLst>
       <p:ext uri="{BB962C8B-B14F-4D97-AF65-F5344CB8AC3E}">
@@ -15212,4 +16571,594 @@
     </a:ext>
   </a:extLst>
 </a:theme>
+</file>
+
+<file path=ppt/theme/theme2.xml><?xml version="1.0" encoding="utf-8"?>
+<a:theme xmlns:a="http://schemas.openxmlformats.org/drawingml/2006/main" name="Office Theme">
+  <a:themeElements>
+    <a:clrScheme name="Office">
+      <a:dk1>
+        <a:sysClr val="windowText" lastClr="000000"/>
+      </a:dk1>
+      <a:lt1>
+        <a:sysClr val="window" lastClr="FFFFFF"/>
+      </a:lt1>
+      <a:dk2>
+        <a:srgbClr val="44546A"/>
+      </a:dk2>
+      <a:lt2>
+        <a:srgbClr val="E7E6E6"/>
+      </a:lt2>
+      <a:accent1>
+        <a:srgbClr val="4472C4"/>
+      </a:accent1>
+      <a:accent2>
+        <a:srgbClr val="ED7D31"/>
+      </a:accent2>
+      <a:accent3>
+        <a:srgbClr val="A5A5A5"/>
+      </a:accent3>
+      <a:accent4>
+        <a:srgbClr val="FFC000"/>
+      </a:accent4>
+      <a:accent5>
+        <a:srgbClr val="5B9BD5"/>
+      </a:accent5>
+      <a:accent6>
+        <a:srgbClr val="70AD47"/>
+      </a:accent6>
+      <a:hlink>
+        <a:srgbClr val="0563C1"/>
+      </a:hlink>
+      <a:folHlink>
+        <a:srgbClr val="954F72"/>
+      </a:folHlink>
+    </a:clrScheme>
+    <a:fontScheme name="Office">
+      <a:majorFont>
+        <a:latin typeface="Calibri Light" panose="020F0302020204030204"/>
+        <a:ea typeface=""/>
+        <a:cs typeface=""/>
+        <a:font script="Jpan" typeface="游ゴシック Light"/>
+        <a:font script="Hang" typeface="맑은 고딕"/>
+        <a:font script="Hans" typeface="等线 Light"/>
+        <a:font script="Hant" typeface="新細明體"/>
+        <a:font script="Arab" typeface="Times New Roman"/>
+        <a:font script="Hebr" typeface="Times New Roman"/>
+        <a:font script="Thai" typeface="Angsana New"/>
+        <a:font script="Ethi" typeface="Nyala"/>
+        <a:font script="Beng" typeface="Vrinda"/>
+        <a:font script="Gujr" typeface="Shruti"/>
+        <a:font script="Khmr" typeface="MoolBoran"/>
+        <a:font script="Knda" typeface="Tunga"/>
+        <a:font script="Guru" typeface="Raavi"/>
+        <a:font script="Cans" typeface="Euphemia"/>
+        <a:font script="Cher" typeface="Plantagenet Cherokee"/>
+        <a:font script="Yiii" typeface="Microsoft Yi Baiti"/>
+        <a:font script="Tibt" typeface="Microsoft Himalaya"/>
+        <a:font script="Thaa" typeface="MV Boli"/>
+        <a:font script="Deva" typeface="Mangal"/>
+        <a:font script="Telu" typeface="Gautami"/>
+        <a:font script="Taml" typeface="Latha"/>
+        <a:font script="Syrc" typeface="Estrangelo Edessa"/>
+        <a:font script="Orya" typeface="Kalinga"/>
+        <a:font script="Mlym" typeface="Kartika"/>
+        <a:font script="Laoo" typeface="DokChampa"/>
+        <a:font script="Sinh" typeface="Iskoola Pota"/>
+        <a:font script="Mong" typeface="Mongolian Baiti"/>
+        <a:font script="Viet" typeface="Times New Roman"/>
+        <a:font script="Uigh" typeface="Microsoft Uighur"/>
+        <a:font script="Geor" typeface="Sylfaen"/>
+        <a:font script="Armn" typeface="Arial"/>
+        <a:font script="Bugi" typeface="Leelawadee UI"/>
+        <a:font script="Bopo" typeface="Microsoft JhengHei"/>
+        <a:font script="Java" typeface="Javanese Text"/>
+        <a:font script="Lisu" typeface="Segoe UI"/>
+        <a:font script="Mymr" typeface="Myanmar Text"/>
+        <a:font script="Nkoo" typeface="Ebrima"/>
+        <a:font script="Olck" typeface="Nirmala UI"/>
+        <a:font script="Osma" typeface="Ebrima"/>
+        <a:font script="Phag" typeface="Phagspa"/>
+        <a:font script="Syrn" typeface="Estrangelo Edessa"/>
+        <a:font script="Syrj" typeface="Estrangelo Edessa"/>
+        <a:font script="Syre" typeface="Estrangelo Edessa"/>
+        <a:font script="Sora" typeface="Nirmala UI"/>
+        <a:font script="Tale" typeface="Microsoft Tai Le"/>
+        <a:font script="Talu" typeface="Microsoft New Tai Lue"/>
+        <a:font script="Tfng" typeface="Ebrima"/>
+      </a:majorFont>
+      <a:minorFont>
+        <a:latin typeface="Calibri" panose="020F0502020204030204"/>
+        <a:ea typeface=""/>
+        <a:cs typeface=""/>
+        <a:font script="Jpan" typeface="游ゴシック"/>
+        <a:font script="Hang" typeface="맑은 고딕"/>
+        <a:font script="Hans" typeface="等线"/>
+        <a:font script="Hant" typeface="新細明體"/>
+        <a:font script="Arab" typeface="Arial"/>
+        <a:font script="Hebr" typeface="Arial"/>
+        <a:font script="Thai" typeface="Cordia New"/>
+        <a:font script="Ethi" typeface="Nyala"/>
+        <a:font script="Beng" typeface="Vrinda"/>
+        <a:font script="Gujr" typeface="Shruti"/>
+        <a:font script="Khmr" typeface="DaunPenh"/>
+        <a:font script="Knda" typeface="Tunga"/>
+        <a:font script="Guru" typeface="Raavi"/>
+        <a:font script="Cans" typeface="Euphemia"/>
+        <a:font script="Cher" typeface="Plantagenet Cherokee"/>
+        <a:font script="Yiii" typeface="Microsoft Yi Baiti"/>
+        <a:font script="Tibt" typeface="Microsoft Himalaya"/>
+        <a:font script="Thaa" typeface="MV Boli"/>
+        <a:font script="Deva" typeface="Mangal"/>
+        <a:font script="Telu" typeface="Gautami"/>
+        <a:font script="Taml" typeface="Latha"/>
+        <a:font script="Syrc" typeface="Estrangelo Edessa"/>
+        <a:font script="Orya" typeface="Kalinga"/>
+        <a:font script="Mlym" typeface="Kartika"/>
+        <a:font script="Laoo" typeface="DokChampa"/>
+        <a:font script="Sinh" typeface="Iskoola Pota"/>
+        <a:font script="Mong" typeface="Mongolian Baiti"/>
+        <a:font script="Viet" typeface="Arial"/>
+        <a:font script="Uigh" typeface="Microsoft Uighur"/>
+        <a:font script="Geor" typeface="Sylfaen"/>
+        <a:font script="Armn" typeface="Arial"/>
+        <a:font script="Bugi" typeface="Leelawadee UI"/>
+        <a:font script="Bopo" typeface="Microsoft JhengHei"/>
+        <a:font script="Java" typeface="Javanese Text"/>
+        <a:font script="Lisu" typeface="Segoe UI"/>
+        <a:font script="Mymr" typeface="Myanmar Text"/>
+        <a:font script="Nkoo" typeface="Ebrima"/>
+        <a:font script="Olck" typeface="Nirmala UI"/>
+        <a:font script="Osma" typeface="Ebrima"/>
+        <a:font script="Phag" typeface="Phagspa"/>
+        <a:font script="Syrn" typeface="Estrangelo Edessa"/>
+        <a:font script="Syrj" typeface="Estrangelo Edessa"/>
+        <a:font script="Syre" typeface="Estrangelo Edessa"/>
+        <a:font script="Sora" typeface="Nirmala UI"/>
+        <a:font script="Tale" typeface="Microsoft Tai Le"/>
+        <a:font script="Talu" typeface="Microsoft New Tai Lue"/>
+        <a:font script="Tfng" typeface="Ebrima"/>
+      </a:minorFont>
+    </a:fontScheme>
+    <a:fmtScheme name="Office">
+      <a:fillStyleLst>
+        <a:solidFill>
+          <a:schemeClr val="phClr"/>
+        </a:solidFill>
+        <a:gradFill rotWithShape="1">
+          <a:gsLst>
+            <a:gs pos="0">
+              <a:schemeClr val="phClr">
+                <a:lumMod val="110000"/>
+                <a:satMod val="105000"/>
+                <a:tint val="67000"/>
+              </a:schemeClr>
+            </a:gs>
+            <a:gs pos="50000">
+              <a:schemeClr val="phClr">
+                <a:lumMod val="105000"/>
+                <a:satMod val="103000"/>
+                <a:tint val="73000"/>
+              </a:schemeClr>
+            </a:gs>
+            <a:gs pos="100000">
+              <a:schemeClr val="phClr">
+                <a:lumMod val="105000"/>
+                <a:satMod val="109000"/>
+                <a:tint val="81000"/>
+              </a:schemeClr>
+            </a:gs>
+          </a:gsLst>
+          <a:lin ang="5400000" scaled="0"/>
+        </a:gradFill>
+        <a:gradFill rotWithShape="1">
+          <a:gsLst>
+            <a:gs pos="0">
+              <a:schemeClr val="phClr">
+                <a:satMod val="103000"/>
+                <a:lumMod val="102000"/>
+                <a:tint val="94000"/>
+              </a:schemeClr>
+            </a:gs>
+            <a:gs pos="50000">
+              <a:schemeClr val="phClr">
+                <a:satMod val="110000"/>
+                <a:lumMod val="100000"/>
+                <a:shade val="100000"/>
+              </a:schemeClr>
+            </a:gs>
+            <a:gs pos="100000">
+              <a:schemeClr val="phClr">
+                <a:lumMod val="99000"/>
+                <a:satMod val="120000"/>
+                <a:shade val="78000"/>
+              </a:schemeClr>
+            </a:gs>
+          </a:gsLst>
+          <a:lin ang="5400000" scaled="0"/>
+        </a:gradFill>
+      </a:fillStyleLst>
+      <a:lnStyleLst>
+        <a:ln w="6350" cap="flat" cmpd="sng" algn="ctr">
+          <a:solidFill>
+            <a:schemeClr val="phClr"/>
+          </a:solidFill>
+          <a:prstDash val="solid"/>
+          <a:miter lim="800000"/>
+        </a:ln>
+        <a:ln w="12700" cap="flat" cmpd="sng" algn="ctr">
+          <a:solidFill>
+            <a:schemeClr val="phClr"/>
+          </a:solidFill>
+          <a:prstDash val="solid"/>
+          <a:miter lim="800000"/>
+        </a:ln>
+        <a:ln w="19050" cap="flat" cmpd="sng" algn="ctr">
+          <a:solidFill>
+            <a:schemeClr val="phClr"/>
+          </a:solidFill>
+          <a:prstDash val="solid"/>
+          <a:miter lim="800000"/>
+        </a:ln>
+      </a:lnStyleLst>
+      <a:effectStyleLst>
+        <a:effectStyle>
+          <a:effectLst/>
+        </a:effectStyle>
+        <a:effectStyle>
+          <a:effectLst/>
+        </a:effectStyle>
+        <a:effectStyle>
+          <a:effectLst>
+            <a:outerShdw blurRad="57150" dist="19050" dir="5400000" algn="ctr" rotWithShape="0">
+              <a:srgbClr val="000000">
+                <a:alpha val="63000"/>
+              </a:srgbClr>
+            </a:outerShdw>
+          </a:effectLst>
+        </a:effectStyle>
+      </a:effectStyleLst>
+      <a:bgFillStyleLst>
+        <a:solidFill>
+          <a:schemeClr val="phClr"/>
+        </a:solidFill>
+        <a:solidFill>
+          <a:schemeClr val="phClr">
+            <a:tint val="95000"/>
+            <a:satMod val="170000"/>
+          </a:schemeClr>
+        </a:solidFill>
+        <a:gradFill rotWithShape="1">
+          <a:gsLst>
+            <a:gs pos="0">
+              <a:schemeClr val="phClr">
+                <a:tint val="93000"/>
+                <a:satMod val="150000"/>
+                <a:shade val="98000"/>
+                <a:lumMod val="102000"/>
+              </a:schemeClr>
+            </a:gs>
+            <a:gs pos="50000">
+              <a:schemeClr val="phClr">
+                <a:tint val="98000"/>
+                <a:satMod val="130000"/>
+                <a:shade val="90000"/>
+                <a:lumMod val="103000"/>
+              </a:schemeClr>
+            </a:gs>
+            <a:gs pos="100000">
+              <a:schemeClr val="phClr">
+                <a:shade val="63000"/>
+                <a:satMod val="120000"/>
+              </a:schemeClr>
+            </a:gs>
+          </a:gsLst>
+          <a:lin ang="5400000" scaled="0"/>
+        </a:gradFill>
+      </a:bgFillStyleLst>
+    </a:fmtScheme>
+  </a:themeElements>
+  <a:objectDefaults/>
+  <a:extraClrSchemeLst/>
+  <a:extLst>
+    <a:ext uri="{05A4C25C-085E-4340-85A3-A5531E510DB2}">
+      <thm15:themeFamily xmlns:thm15="http://schemas.microsoft.com/office/thememl/2012/main" name="Office Theme" id="{62F939B6-93AF-4DB8-9C6B-D6C7DFDC589F}" vid="{4A3C46E8-61CC-4603-A589-7422A47A8E4A}"/>
+    </a:ext>
+  </a:extLst>
+</a:theme>
+</file>
+
+<file path=ppt/theme/theme3.xml><?xml version="1.0" encoding="utf-8"?>
+<a:theme xmlns:a="http://schemas.openxmlformats.org/drawingml/2006/main" name="Office Theme">
+  <a:themeElements>
+    <a:clrScheme name="Office">
+      <a:dk1>
+        <a:sysClr val="windowText" lastClr="000000"/>
+      </a:dk1>
+      <a:lt1>
+        <a:sysClr val="window" lastClr="FFFFFF"/>
+      </a:lt1>
+      <a:dk2>
+        <a:srgbClr val="44546A"/>
+      </a:dk2>
+      <a:lt2>
+        <a:srgbClr val="E7E6E6"/>
+      </a:lt2>
+      <a:accent1>
+        <a:srgbClr val="4472C4"/>
+      </a:accent1>
+      <a:accent2>
+        <a:srgbClr val="ED7D31"/>
+      </a:accent2>
+      <a:accent3>
+        <a:srgbClr val="A5A5A5"/>
+      </a:accent3>
+      <a:accent4>
+        <a:srgbClr val="FFC000"/>
+      </a:accent4>
+      <a:accent5>
+        <a:srgbClr val="5B9BD5"/>
+      </a:accent5>
+      <a:accent6>
+        <a:srgbClr val="70AD47"/>
+      </a:accent6>
+      <a:hlink>
+        <a:srgbClr val="0563C1"/>
+      </a:hlink>
+      <a:folHlink>
+        <a:srgbClr val="954F72"/>
+      </a:folHlink>
+    </a:clrScheme>
+    <a:fontScheme name="Office">
+      <a:majorFont>
+        <a:latin typeface="Calibri Light" panose="020F0302020204030204"/>
+        <a:ea typeface=""/>
+        <a:cs typeface=""/>
+        <a:font script="Jpan" typeface="游ゴシック Light"/>
+        <a:font script="Hang" typeface="맑은 고딕"/>
+        <a:font script="Hans" typeface="等线 Light"/>
+        <a:font script="Hant" typeface="新細明體"/>
+        <a:font script="Arab" typeface="Times New Roman"/>
+        <a:font script="Hebr" typeface="Times New Roman"/>
+        <a:font script="Thai" typeface="Angsana New"/>
+        <a:font script="Ethi" typeface="Nyala"/>
+        <a:font script="Beng" typeface="Vrinda"/>
+        <a:font script="Gujr" typeface="Shruti"/>
+        <a:font script="Khmr" typeface="MoolBoran"/>
+        <a:font script="Knda" typeface="Tunga"/>
+        <a:font script="Guru" typeface="Raavi"/>
+        <a:font script="Cans" typeface="Euphemia"/>
+        <a:font script="Cher" typeface="Plantagenet Cherokee"/>
+        <a:font script="Yiii" typeface="Microsoft Yi Baiti"/>
+        <a:font script="Tibt" typeface="Microsoft Himalaya"/>
+        <a:font script="Thaa" typeface="MV Boli"/>
+        <a:font script="Deva" typeface="Mangal"/>
+        <a:font script="Telu" typeface="Gautami"/>
+        <a:font script="Taml" typeface="Latha"/>
+        <a:font script="Syrc" typeface="Estrangelo Edessa"/>
+        <a:font script="Orya" typeface="Kalinga"/>
+        <a:font script="Mlym" typeface="Kartika"/>
+        <a:font script="Laoo" typeface="DokChampa"/>
+        <a:font script="Sinh" typeface="Iskoola Pota"/>
+        <a:font script="Mong" typeface="Mongolian Baiti"/>
+        <a:font script="Viet" typeface="Times New Roman"/>
+        <a:font script="Uigh" typeface="Microsoft Uighur"/>
+        <a:font script="Geor" typeface="Sylfaen"/>
+        <a:font script="Armn" typeface="Arial"/>
+        <a:font script="Bugi" typeface="Leelawadee UI"/>
+        <a:font script="Bopo" typeface="Microsoft JhengHei"/>
+        <a:font script="Java" typeface="Javanese Text"/>
+        <a:font script="Lisu" typeface="Segoe UI"/>
+        <a:font script="Mymr" typeface="Myanmar Text"/>
+        <a:font script="Nkoo" typeface="Ebrima"/>
+        <a:font script="Olck" typeface="Nirmala UI"/>
+        <a:font script="Osma" typeface="Ebrima"/>
+        <a:font script="Phag" typeface="Phagspa"/>
+        <a:font script="Syrn" typeface="Estrangelo Edessa"/>
+        <a:font script="Syrj" typeface="Estrangelo Edessa"/>
+        <a:font script="Syre" typeface="Estrangelo Edessa"/>
+        <a:font script="Sora" typeface="Nirmala UI"/>
+        <a:font script="Tale" typeface="Microsoft Tai Le"/>
+        <a:font script="Talu" typeface="Microsoft New Tai Lue"/>
+        <a:font script="Tfng" typeface="Ebrima"/>
+      </a:majorFont>
+      <a:minorFont>
+        <a:latin typeface="Calibri" panose="020F0502020204030204"/>
+        <a:ea typeface=""/>
+        <a:cs typeface=""/>
+        <a:font script="Jpan" typeface="游ゴシック"/>
+        <a:font script="Hang" typeface="맑은 고딕"/>
+        <a:font script="Hans" typeface="等线"/>
+        <a:font script="Hant" typeface="新細明體"/>
+        <a:font script="Arab" typeface="Arial"/>
+        <a:font script="Hebr" typeface="Arial"/>
+        <a:font script="Thai" typeface="Cordia New"/>
+        <a:font script="Ethi" typeface="Nyala"/>
+        <a:font script="Beng" typeface="Vrinda"/>
+        <a:font script="Gujr" typeface="Shruti"/>
+        <a:font script="Khmr" typeface="DaunPenh"/>
+        <a:font script="Knda" typeface="Tunga"/>
+        <a:font script="Guru" typeface="Raavi"/>
+        <a:font script="Cans" typeface="Euphemia"/>
+        <a:font script="Cher" typeface="Plantagenet Cherokee"/>
+        <a:font script="Yiii" typeface="Microsoft Yi Baiti"/>
+        <a:font script="Tibt" typeface="Microsoft Himalaya"/>
+        <a:font script="Thaa" typeface="MV Boli"/>
+        <a:font script="Deva" typeface="Mangal"/>
+        <a:font script="Telu" typeface="Gautami"/>
+        <a:font script="Taml" typeface="Latha"/>
+        <a:font script="Syrc" typeface="Estrangelo Edessa"/>
+        <a:font script="Orya" typeface="Kalinga"/>
+        <a:font script="Mlym" typeface="Kartika"/>
+        <a:font script="Laoo" typeface="DokChampa"/>
+        <a:font script="Sinh" typeface="Iskoola Pota"/>
+        <a:font script="Mong" typeface="Mongolian Baiti"/>
+        <a:font script="Viet" typeface="Arial"/>
+        <a:font script="Uigh" typeface="Microsoft Uighur"/>
+        <a:font script="Geor" typeface="Sylfaen"/>
+        <a:font script="Armn" typeface="Arial"/>
+        <a:font script="Bugi" typeface="Leelawadee UI"/>
+        <a:font script="Bopo" typeface="Microsoft JhengHei"/>
+        <a:font script="Java" typeface="Javanese Text"/>
+        <a:font script="Lisu" typeface="Segoe UI"/>
+        <a:font script="Mymr" typeface="Myanmar Text"/>
+        <a:font script="Nkoo" typeface="Ebrima"/>
+        <a:font script="Olck" typeface="Nirmala UI"/>
+        <a:font script="Osma" typeface="Ebrima"/>
+        <a:font script="Phag" typeface="Phagspa"/>
+        <a:font script="Syrn" typeface="Estrangelo Edessa"/>
+        <a:font script="Syrj" typeface="Estrangelo Edessa"/>
+        <a:font script="Syre" typeface="Estrangelo Edessa"/>
+        <a:font script="Sora" typeface="Nirmala UI"/>
+        <a:font script="Tale" typeface="Microsoft Tai Le"/>
+        <a:font script="Talu" typeface="Microsoft New Tai Lue"/>
+        <a:font script="Tfng" typeface="Ebrima"/>
+      </a:minorFont>
+    </a:fontScheme>
+    <a:fmtScheme name="Office">
+      <a:fillStyleLst>
+        <a:solidFill>
+          <a:schemeClr val="phClr"/>
+        </a:solidFill>
+        <a:gradFill rotWithShape="1">
+          <a:gsLst>
+            <a:gs pos="0">
+              <a:schemeClr val="phClr">
+                <a:lumMod val="110000"/>
+                <a:satMod val="105000"/>
+                <a:tint val="67000"/>
+              </a:schemeClr>
+            </a:gs>
+            <a:gs pos="50000">
+              <a:schemeClr val="phClr">
+                <a:lumMod val="105000"/>
+                <a:satMod val="103000"/>
+                <a:tint val="73000"/>
+              </a:schemeClr>
+            </a:gs>
+            <a:gs pos="100000">
+              <a:schemeClr val="phClr">
+                <a:lumMod val="105000"/>
+                <a:satMod val="109000"/>
+                <a:tint val="81000"/>
+              </a:schemeClr>
+            </a:gs>
+          </a:gsLst>
+          <a:lin ang="5400000" scaled="0"/>
+        </a:gradFill>
+        <a:gradFill rotWithShape="1">
+          <a:gsLst>
+            <a:gs pos="0">
+              <a:schemeClr val="phClr">
+                <a:satMod val="103000"/>
+                <a:lumMod val="102000"/>
+                <a:tint val="94000"/>
+              </a:schemeClr>
+            </a:gs>
+            <a:gs pos="50000">
+              <a:schemeClr val="phClr">
+                <a:satMod val="110000"/>
+                <a:lumMod val="100000"/>
+                <a:shade val="100000"/>
+              </a:schemeClr>
+            </a:gs>
+            <a:gs pos="100000">
+              <a:schemeClr val="phClr">
+                <a:lumMod val="99000"/>
+                <a:satMod val="120000"/>
+                <a:shade val="78000"/>
+              </a:schemeClr>
+            </a:gs>
+          </a:gsLst>
+          <a:lin ang="5400000" scaled="0"/>
+        </a:gradFill>
+      </a:fillStyleLst>
+      <a:lnStyleLst>
+        <a:ln w="6350" cap="flat" cmpd="sng" algn="ctr">
+          <a:solidFill>
+            <a:schemeClr val="phClr"/>
+          </a:solidFill>
+          <a:prstDash val="solid"/>
+          <a:miter lim="800000"/>
+        </a:ln>
+        <a:ln w="12700" cap="flat" cmpd="sng" algn="ctr">
+          <a:solidFill>
+            <a:schemeClr val="phClr"/>
+          </a:solidFill>
+          <a:prstDash val="solid"/>
+          <a:miter lim="800000"/>
+        </a:ln>
+        <a:ln w="19050" cap="flat" cmpd="sng" algn="ctr">
+          <a:solidFill>
+            <a:schemeClr val="phClr"/>
+          </a:solidFill>
+          <a:prstDash val="solid"/>
+          <a:miter lim="800000"/>
+        </a:ln>
+      </a:lnStyleLst>
+      <a:effectStyleLst>
+        <a:effectStyle>
+          <a:effectLst/>
+        </a:effectStyle>
+        <a:effectStyle>
+          <a:effectLst/>
+        </a:effectStyle>
+        <a:effectStyle>
+          <a:effectLst>
+            <a:outerShdw blurRad="57150" dist="19050" dir="5400000" algn="ctr" rotWithShape="0">
+              <a:srgbClr val="000000">
+                <a:alpha val="63000"/>
+              </a:srgbClr>
+            </a:outerShdw>
+          </a:effectLst>
+        </a:effectStyle>
+      </a:effectStyleLst>
+      <a:bgFillStyleLst>
+        <a:solidFill>
+          <a:schemeClr val="phClr"/>
+        </a:solidFill>
+        <a:solidFill>
+          <a:schemeClr val="phClr">
+            <a:tint val="95000"/>
+            <a:satMod val="170000"/>
+          </a:schemeClr>
+        </a:solidFill>
+        <a:gradFill rotWithShape="1">
+          <a:gsLst>
+            <a:gs pos="0">
+              <a:schemeClr val="phClr">
+                <a:tint val="93000"/>
+                <a:satMod val="150000"/>
+                <a:shade val="98000"/>
+                <a:lumMod val="102000"/>
+              </a:schemeClr>
+            </a:gs>
+            <a:gs pos="50000">
+              <a:schemeClr val="phClr">
+                <a:tint val="98000"/>
+                <a:satMod val="130000"/>
+                <a:shade val="90000"/>
+                <a:lumMod val="103000"/>
+              </a:schemeClr>
+            </a:gs>
+            <a:gs pos="100000">
+              <a:schemeClr val="phClr">
+                <a:shade val="63000"/>
+                <a:satMod val="120000"/>
+              </a:schemeClr>
+            </a:gs>
+          </a:gsLst>
+          <a:lin ang="5400000" scaled="0"/>
+        </a:gradFill>
+      </a:bgFillStyleLst>
+    </a:fmtScheme>
+  </a:themeElements>
+  <a:objectDefaults/>
+  <a:extraClrSchemeLst/>
+  <a:extLst>
+    <a:ext uri="{05A4C25C-085E-4340-85A3-A5531E510DB2}">
+      <thm15:themeFamily xmlns:thm15="http://schemas.microsoft.com/office/thememl/2012/main" name="Office Theme" id="{62F939B6-93AF-4DB8-9C6B-D6C7DFDC589F}" vid="{4A3C46E8-61CC-4603-A589-7422A47A8E4A}"/>
+    </a:ext>
+  </a:extLst>
+</a:theme>
 </file>
</xml_diff>

<commit_message>
Hoàn thành bài thuyết trình, báo cáo luận văn. In ra là finish.
</commit_message>
<xml_diff>
--- a/Presentation-LuanVan.pptx
+++ b/Presentation-LuanVan.pptx
@@ -254,7 +254,7 @@
           <a:p>
             <a:fld id="{03458F59-5BFC-4C23-A30B-0CD1767A6077}" type="datetimeFigureOut">
               <a:rPr lang="en-US" smtClean="0"/>
-              <a:t>28-Nov-17</a:t>
+              <a:t>02-Dec-17</a:t>
             </a:fld>
             <a:endParaRPr lang="en-US"/>
           </a:p>
@@ -432,7 +432,7 @@
           <a:p>
             <a:fld id="{C3485123-472A-4794-AC61-7D4BD4EA3B0F}" type="datetimeFigureOut">
               <a:rPr lang="en-US" smtClean="0"/>
-              <a:t>28-Nov-17</a:t>
+              <a:t>02-Dec-17</a:t>
             </a:fld>
             <a:endParaRPr lang="en-US"/>
           </a:p>
@@ -1422,7 +1422,7 @@
           <a:p>
             <a:fld id="{735D7303-448D-4987-A713-76FC59F558D7}" type="datetime1">
               <a:rPr lang="en-US" smtClean="0"/>
-              <a:t>28-Nov-17</a:t>
+              <a:t>02-Dec-17</a:t>
             </a:fld>
             <a:endParaRPr lang="en-US"/>
           </a:p>
@@ -1673,7 +1673,7 @@
           <a:p>
             <a:fld id="{3A168744-867E-4C24-8B2E-AF302187F4BF}" type="datetime1">
               <a:rPr lang="en-US" smtClean="0"/>
-              <a:t>28-Nov-17</a:t>
+              <a:t>02-Dec-17</a:t>
             </a:fld>
             <a:endParaRPr lang="en-US"/>
           </a:p>
@@ -1987,7 +1987,7 @@
           <a:p>
             <a:fld id="{4E37A866-E1EF-4238-B2BE-30EF4FE8AB8B}" type="datetime1">
               <a:rPr lang="en-US" smtClean="0"/>
-              <a:t>28-Nov-17</a:t>
+              <a:t>02-Dec-17</a:t>
             </a:fld>
             <a:endParaRPr lang="en-US"/>
           </a:p>
@@ -2328,7 +2328,7 @@
           <a:p>
             <a:fld id="{473C88BB-6CEE-48B5-A07A-84EC3F1C940F}" type="datetime1">
               <a:rPr lang="en-US" smtClean="0"/>
-              <a:t>28-Nov-17</a:t>
+              <a:t>02-Dec-17</a:t>
             </a:fld>
             <a:endParaRPr lang="en-US"/>
           </a:p>
@@ -2642,7 +2642,7 @@
           <a:p>
             <a:fld id="{0C8D88AC-8907-4979-9AC5-0446AA2547BC}" type="datetime1">
               <a:rPr lang="en-US" smtClean="0"/>
-              <a:t>28-Nov-17</a:t>
+              <a:t>02-Dec-17</a:t>
             </a:fld>
             <a:endParaRPr lang="en-US"/>
           </a:p>
@@ -3035,7 +3035,7 @@
           <a:p>
             <a:fld id="{8B6ABAD7-3757-45A7-BC7A-8CE5E952CE8A}" type="datetime1">
               <a:rPr lang="en-US" smtClean="0"/>
-              <a:t>28-Nov-17</a:t>
+              <a:t>02-Dec-17</a:t>
             </a:fld>
             <a:endParaRPr lang="en-US"/>
           </a:p>
@@ -3205,7 +3205,7 @@
           <a:p>
             <a:fld id="{EDE45C13-6047-4259-9E1A-846E393D5B05}" type="datetime1">
               <a:rPr lang="en-US" smtClean="0"/>
-              <a:t>28-Nov-17</a:t>
+              <a:t>02-Dec-17</a:t>
             </a:fld>
             <a:endParaRPr lang="en-US"/>
           </a:p>
@@ -3385,7 +3385,7 @@
           <a:p>
             <a:fld id="{3AF0B478-AB28-407B-B8C1-FCE727390921}" type="datetime1">
               <a:rPr lang="en-US" smtClean="0"/>
-              <a:t>28-Nov-17</a:t>
+              <a:t>02-Dec-17</a:t>
             </a:fld>
             <a:endParaRPr lang="en-US"/>
           </a:p>
@@ -3561,7 +3561,7 @@
           <a:p>
             <a:fld id="{82281CFB-9E30-441C-B9D8-0729BDB9F586}" type="datetime1">
               <a:rPr lang="en-US" smtClean="0"/>
-              <a:t>28-Nov-17</a:t>
+              <a:t>02-Dec-17</a:t>
             </a:fld>
             <a:endParaRPr lang="en-US"/>
           </a:p>
@@ -3808,7 +3808,7 @@
           <a:p>
             <a:fld id="{C72E0282-C93F-4BA3-BA27-9E409DBD4F37}" type="datetime1">
               <a:rPr lang="en-US" smtClean="0"/>
-              <a:t>28-Nov-17</a:t>
+              <a:t>02-Dec-17</a:t>
             </a:fld>
             <a:endParaRPr lang="en-US"/>
           </a:p>
@@ -4040,7 +4040,7 @@
           <a:p>
             <a:fld id="{BFABBAD4-E38D-40D2-A1FA-160C593122CE}" type="datetime1">
               <a:rPr lang="en-US" smtClean="0"/>
-              <a:t>28-Nov-17</a:t>
+              <a:t>02-Dec-17</a:t>
             </a:fld>
             <a:endParaRPr lang="en-US"/>
           </a:p>
@@ -4414,7 +4414,7 @@
           <a:p>
             <a:fld id="{79981F0E-01BA-4931-9B7C-048789FA0F66}" type="datetime1">
               <a:rPr lang="en-US" smtClean="0"/>
-              <a:t>28-Nov-17</a:t>
+              <a:t>02-Dec-17</a:t>
             </a:fld>
             <a:endParaRPr lang="en-US"/>
           </a:p>
@@ -4537,7 +4537,7 @@
           <a:p>
             <a:fld id="{AD5CAD07-739F-4193-B763-9A1F340D3CA3}" type="datetime1">
               <a:rPr lang="en-US" smtClean="0"/>
-              <a:t>28-Nov-17</a:t>
+              <a:t>02-Dec-17</a:t>
             </a:fld>
             <a:endParaRPr lang="en-US"/>
           </a:p>
@@ -4632,7 +4632,7 @@
           <a:p>
             <a:fld id="{8A8CA216-30D1-479F-81E1-D17C3D302EE3}" type="datetime1">
               <a:rPr lang="en-US" smtClean="0"/>
-              <a:t>28-Nov-17</a:t>
+              <a:t>02-Dec-17</a:t>
             </a:fld>
             <a:endParaRPr lang="en-US"/>
           </a:p>
@@ -4887,7 +4887,7 @@
           <a:p>
             <a:fld id="{0D936126-1216-4D53-AF20-0E9966B95E8B}" type="datetime1">
               <a:rPr lang="en-US" smtClean="0"/>
-              <a:t>28-Nov-17</a:t>
+              <a:t>02-Dec-17</a:t>
             </a:fld>
             <a:endParaRPr lang="en-US"/>
           </a:p>
@@ -5150,7 +5150,7 @@
           <a:p>
             <a:fld id="{2D91A28C-04A7-4BA1-A90F-F26E6C3E8D83}" type="datetime1">
               <a:rPr lang="en-US" smtClean="0"/>
-              <a:t>28-Nov-17</a:t>
+              <a:t>02-Dec-17</a:t>
             </a:fld>
             <a:endParaRPr lang="en-US"/>
           </a:p>
@@ -5893,7 +5893,7 @@
           <a:p>
             <a:fld id="{08532FE4-17FC-4AA3-A264-75779A4D6D0A}" type="datetime1">
               <a:rPr lang="en-US" smtClean="0"/>
-              <a:t>28-Nov-17</a:t>
+              <a:t>02-Dec-17</a:t>
             </a:fld>
             <a:endParaRPr lang="en-US"/>
           </a:p>
@@ -6842,8 +6842,8 @@
         </p:nvSpPr>
         <p:spPr>
           <a:xfrm>
-            <a:off x="4462181" y="4980137"/>
-            <a:ext cx="4786888" cy="1384995"/>
+            <a:off x="4503058" y="4980137"/>
+            <a:ext cx="4705134" cy="1384995"/>
           </a:xfrm>
           <a:prstGeom prst="rect">
             <a:avLst/>
@@ -6864,25 +6864,7 @@
                   <a:srgbClr val="00B050"/>
                 </a:solidFill>
               </a:rPr>
-              <a:t>GVHD	: 	</a:t>
-            </a:r>
-            <a:r>
-              <a:rPr lang="en-US" sz="2800" b="1" dirty="0" err="1">
-                <a:ln w="0"/>
-                <a:solidFill>
-                  <a:srgbClr val="00B050"/>
-                </a:solidFill>
-              </a:rPr>
-              <a:t>Ths</a:t>
-            </a:r>
-            <a:r>
-              <a:rPr lang="en-US" sz="2800" b="1" dirty="0">
-                <a:ln w="0"/>
-                <a:solidFill>
-                  <a:srgbClr val="00B050"/>
-                </a:solidFill>
-              </a:rPr>
-              <a:t> Lê </a:t>
+              <a:t>GVHD	: 	TS. Lê </a:t>
             </a:r>
             <a:r>
               <a:rPr lang="en-US" sz="2800" b="1" dirty="0" err="1">

</xml_diff>